<commit_message>
Continued with GUI development
</commit_message>
<xml_diff>
--- a/doc/documentation.pptx
+++ b/doc/documentation.pptx
@@ -8,6 +8,7 @@
     <p:sldId id="257" r:id="rId2"/>
     <p:sldId id="259" r:id="rId3"/>
     <p:sldId id="258" r:id="rId4"/>
+    <p:sldId id="260" r:id="rId5"/>
   </p:sldIdLst>
   <p:sldSz cx="12192000" cy="6858000"/>
   <p:notesSz cx="6858000" cy="9144000"/>
@@ -263,7 +264,7 @@
           <a:p>
             <a:fld id="{0ED28CAB-510F-433F-B3DF-2EF294A88DA1}" type="datetimeFigureOut">
               <a:rPr lang="en-US" smtClean="0"/>
-              <a:t>5/1/2025</a:t>
+              <a:t>5/7/2025</a:t>
             </a:fld>
             <a:endParaRPr lang="en-US"/>
           </a:p>
@@ -463,7 +464,7 @@
           <a:p>
             <a:fld id="{0ED28CAB-510F-433F-B3DF-2EF294A88DA1}" type="datetimeFigureOut">
               <a:rPr lang="en-US" smtClean="0"/>
-              <a:t>5/1/2025</a:t>
+              <a:t>5/7/2025</a:t>
             </a:fld>
             <a:endParaRPr lang="en-US"/>
           </a:p>
@@ -673,7 +674,7 @@
           <a:p>
             <a:fld id="{0ED28CAB-510F-433F-B3DF-2EF294A88DA1}" type="datetimeFigureOut">
               <a:rPr lang="en-US" smtClean="0"/>
-              <a:t>5/1/2025</a:t>
+              <a:t>5/7/2025</a:t>
             </a:fld>
             <a:endParaRPr lang="en-US"/>
           </a:p>
@@ -873,7 +874,7 @@
           <a:p>
             <a:fld id="{0ED28CAB-510F-433F-B3DF-2EF294A88DA1}" type="datetimeFigureOut">
               <a:rPr lang="en-US" smtClean="0"/>
-              <a:t>5/1/2025</a:t>
+              <a:t>5/7/2025</a:t>
             </a:fld>
             <a:endParaRPr lang="en-US"/>
           </a:p>
@@ -1149,7 +1150,7 @@
           <a:p>
             <a:fld id="{0ED28CAB-510F-433F-B3DF-2EF294A88DA1}" type="datetimeFigureOut">
               <a:rPr lang="en-US" smtClean="0"/>
-              <a:t>5/1/2025</a:t>
+              <a:t>5/7/2025</a:t>
             </a:fld>
             <a:endParaRPr lang="en-US"/>
           </a:p>
@@ -1417,7 +1418,7 @@
           <a:p>
             <a:fld id="{0ED28CAB-510F-433F-B3DF-2EF294A88DA1}" type="datetimeFigureOut">
               <a:rPr lang="en-US" smtClean="0"/>
-              <a:t>5/1/2025</a:t>
+              <a:t>5/7/2025</a:t>
             </a:fld>
             <a:endParaRPr lang="en-US"/>
           </a:p>
@@ -1832,7 +1833,7 @@
           <a:p>
             <a:fld id="{0ED28CAB-510F-433F-B3DF-2EF294A88DA1}" type="datetimeFigureOut">
               <a:rPr lang="en-US" smtClean="0"/>
-              <a:t>5/1/2025</a:t>
+              <a:t>5/7/2025</a:t>
             </a:fld>
             <a:endParaRPr lang="en-US"/>
           </a:p>
@@ -1974,7 +1975,7 @@
           <a:p>
             <a:fld id="{0ED28CAB-510F-433F-B3DF-2EF294A88DA1}" type="datetimeFigureOut">
               <a:rPr lang="en-US" smtClean="0"/>
-              <a:t>5/1/2025</a:t>
+              <a:t>5/7/2025</a:t>
             </a:fld>
             <a:endParaRPr lang="en-US"/>
           </a:p>
@@ -2087,7 +2088,7 @@
           <a:p>
             <a:fld id="{0ED28CAB-510F-433F-B3DF-2EF294A88DA1}" type="datetimeFigureOut">
               <a:rPr lang="en-US" smtClean="0"/>
-              <a:t>5/1/2025</a:t>
+              <a:t>5/7/2025</a:t>
             </a:fld>
             <a:endParaRPr lang="en-US"/>
           </a:p>
@@ -2400,7 +2401,7 @@
           <a:p>
             <a:fld id="{0ED28CAB-510F-433F-B3DF-2EF294A88DA1}" type="datetimeFigureOut">
               <a:rPr lang="en-US" smtClean="0"/>
-              <a:t>5/1/2025</a:t>
+              <a:t>5/7/2025</a:t>
             </a:fld>
             <a:endParaRPr lang="en-US"/>
           </a:p>
@@ -2689,7 +2690,7 @@
           <a:p>
             <a:fld id="{0ED28CAB-510F-433F-B3DF-2EF294A88DA1}" type="datetimeFigureOut">
               <a:rPr lang="en-US" smtClean="0"/>
-              <a:t>5/1/2025</a:t>
+              <a:t>5/7/2025</a:t>
             </a:fld>
             <a:endParaRPr lang="en-US"/>
           </a:p>
@@ -2932,7 +2933,7 @@
           <a:p>
             <a:fld id="{0ED28CAB-510F-433F-B3DF-2EF294A88DA1}" type="datetimeFigureOut">
               <a:rPr lang="en-US" smtClean="0"/>
-              <a:t>5/1/2025</a:t>
+              <a:t>5/7/2025</a:t>
             </a:fld>
             <a:endParaRPr lang="en-US"/>
           </a:p>
@@ -9001,6 +9002,2377 @@
 </p:sld>
 </file>
 
+<file path=ppt/slides/slide4.xml><?xml version="1.0" encoding="utf-8"?>
+<p:sld xmlns:a="http://schemas.openxmlformats.org/drawingml/2006/main" xmlns:r="http://schemas.openxmlformats.org/officeDocument/2006/relationships" xmlns:p="http://schemas.openxmlformats.org/presentationml/2006/main">
+  <p:cSld>
+    <p:spTree>
+      <p:nvGrpSpPr>
+        <p:cNvPr id="1" name=""/>
+        <p:cNvGrpSpPr/>
+        <p:nvPr/>
+      </p:nvGrpSpPr>
+      <p:grpSpPr>
+        <a:xfrm>
+          <a:off x="0" y="0"/>
+          <a:ext cx="0" cy="0"/>
+          <a:chOff x="0" y="0"/>
+          <a:chExt cx="0" cy="0"/>
+        </a:xfrm>
+      </p:grpSpPr>
+      <p:sp>
+        <p:nvSpPr>
+          <p:cNvPr id="88" name="Rechteck 87">
+            <a:extLst>
+              <a:ext uri="{FF2B5EF4-FFF2-40B4-BE49-F238E27FC236}">
+                <a16:creationId xmlns:a16="http://schemas.microsoft.com/office/drawing/2014/main" id="{BBCC69F1-D299-449A-8ADB-D25F5DF37F2A}"/>
+              </a:ext>
+            </a:extLst>
+          </p:cNvPr>
+          <p:cNvSpPr/>
+          <p:nvPr/>
+        </p:nvSpPr>
+        <p:spPr>
+          <a:xfrm>
+            <a:off x="0" y="-6246"/>
+            <a:ext cx="12192000" cy="949387"/>
+          </a:xfrm>
+          <a:prstGeom prst="rect">
+            <a:avLst/>
+          </a:prstGeom>
+          <a:noFill/>
+          <a:ln>
+            <a:noFill/>
+          </a:ln>
+        </p:spPr>
+        <p:style>
+          <a:lnRef idx="2">
+            <a:schemeClr val="accent1">
+              <a:shade val="50000"/>
+            </a:schemeClr>
+          </a:lnRef>
+          <a:fillRef idx="1">
+            <a:schemeClr val="accent1"/>
+          </a:fillRef>
+          <a:effectRef idx="0">
+            <a:schemeClr val="accent1"/>
+          </a:effectRef>
+          <a:fontRef idx="minor">
+            <a:schemeClr val="lt1"/>
+          </a:fontRef>
+        </p:style>
+        <p:txBody>
+          <a:bodyPr rtlCol="0" anchor="ctr"/>
+          <a:lstStyle/>
+          <a:p>
+            <a:pPr algn="ctr"/>
+            <a:r>
+              <a:rPr lang="en-US" sz="3000" dirty="0">
+                <a:solidFill>
+                  <a:schemeClr val="tx1"/>
+                </a:solidFill>
+                <a:latin typeface="3270 Nerd Font" panose="02000509000000000000" pitchFamily="49" charset="0"/>
+                <a:ea typeface="3270 Nerd Font" panose="02000509000000000000" pitchFamily="49" charset="0"/>
+                <a:cs typeface="3270 Nerd Font" panose="02000509000000000000" pitchFamily="49" charset="0"/>
+              </a:rPr>
+              <a:t>GUI</a:t>
+            </a:r>
+          </a:p>
+        </p:txBody>
+      </p:sp>
+      <p:grpSp>
+        <p:nvGrpSpPr>
+          <p:cNvPr id="7" name="Gruppieren 6">
+            <a:extLst>
+              <a:ext uri="{FF2B5EF4-FFF2-40B4-BE49-F238E27FC236}">
+                <a16:creationId xmlns:a16="http://schemas.microsoft.com/office/drawing/2014/main" id="{AB8DE926-E0AA-4479-86A9-12E73FEF27D1}"/>
+              </a:ext>
+            </a:extLst>
+          </p:cNvPr>
+          <p:cNvGrpSpPr/>
+          <p:nvPr/>
+        </p:nvGrpSpPr>
+        <p:grpSpPr>
+          <a:xfrm>
+            <a:off x="2098110" y="943141"/>
+            <a:ext cx="8022920" cy="5138237"/>
+            <a:chOff x="2098110" y="943141"/>
+            <a:chExt cx="8022920" cy="5138237"/>
+          </a:xfrm>
+        </p:grpSpPr>
+        <p:sp>
+          <p:nvSpPr>
+            <p:cNvPr id="6" name="Rechteck 5">
+              <a:extLst>
+                <a:ext uri="{FF2B5EF4-FFF2-40B4-BE49-F238E27FC236}">
+                  <a16:creationId xmlns:a16="http://schemas.microsoft.com/office/drawing/2014/main" id="{CD31A267-B480-49CC-B867-0365E0F5BE57}"/>
+                </a:ext>
+              </a:extLst>
+            </p:cNvPr>
+            <p:cNvSpPr/>
+            <p:nvPr/>
+          </p:nvSpPr>
+          <p:spPr>
+            <a:xfrm>
+              <a:off x="2098110" y="943141"/>
+              <a:ext cx="8022920" cy="5138237"/>
+            </a:xfrm>
+            <a:prstGeom prst="rect">
+              <a:avLst/>
+            </a:prstGeom>
+            <a:solidFill>
+              <a:schemeClr val="bg1"/>
+            </a:solidFill>
+            <a:ln>
+              <a:solidFill>
+                <a:schemeClr val="bg1"/>
+              </a:solidFill>
+            </a:ln>
+          </p:spPr>
+          <p:style>
+            <a:lnRef idx="2">
+              <a:schemeClr val="accent1">
+                <a:shade val="50000"/>
+              </a:schemeClr>
+            </a:lnRef>
+            <a:fillRef idx="1">
+              <a:schemeClr val="accent1"/>
+            </a:fillRef>
+            <a:effectRef idx="0">
+              <a:schemeClr val="accent1"/>
+            </a:effectRef>
+            <a:fontRef idx="minor">
+              <a:schemeClr val="lt1"/>
+            </a:fontRef>
+          </p:style>
+          <p:txBody>
+            <a:bodyPr rtlCol="0" anchor="ctr"/>
+            <a:lstStyle/>
+            <a:p>
+              <a:pPr algn="ctr"/>
+              <a:endParaRPr lang="en-US"/>
+            </a:p>
+          </p:txBody>
+        </p:sp>
+        <p:grpSp>
+          <p:nvGrpSpPr>
+            <p:cNvPr id="4" name="Gruppieren 3">
+              <a:extLst>
+                <a:ext uri="{FF2B5EF4-FFF2-40B4-BE49-F238E27FC236}">
+                  <a16:creationId xmlns:a16="http://schemas.microsoft.com/office/drawing/2014/main" id="{866A674B-3401-4765-859A-E1EBA404A8EA}"/>
+                </a:ext>
+              </a:extLst>
+            </p:cNvPr>
+            <p:cNvGrpSpPr/>
+            <p:nvPr/>
+          </p:nvGrpSpPr>
+          <p:grpSpPr>
+            <a:xfrm>
+              <a:off x="2283648" y="1156111"/>
+              <a:ext cx="7624704" cy="4781627"/>
+              <a:chOff x="2283648" y="1156111"/>
+              <a:chExt cx="7624704" cy="4781627"/>
+            </a:xfrm>
+          </p:grpSpPr>
+          <p:grpSp>
+            <p:nvGrpSpPr>
+              <p:cNvPr id="87" name="Gruppieren 86">
+                <a:extLst>
+                  <a:ext uri="{FF2B5EF4-FFF2-40B4-BE49-F238E27FC236}">
+                    <a16:creationId xmlns:a16="http://schemas.microsoft.com/office/drawing/2014/main" id="{5372E1EB-FBCE-42B8-A5E4-53E05EA26DD2}"/>
+                  </a:ext>
+                </a:extLst>
+              </p:cNvPr>
+              <p:cNvGrpSpPr/>
+              <p:nvPr/>
+            </p:nvGrpSpPr>
+            <p:grpSpPr>
+              <a:xfrm>
+                <a:off x="2419611" y="1156111"/>
+                <a:ext cx="7352777" cy="3633297"/>
+                <a:chOff x="2419611" y="1929344"/>
+                <a:chExt cx="7352777" cy="3633297"/>
+              </a:xfrm>
+            </p:grpSpPr>
+            <p:grpSp>
+              <p:nvGrpSpPr>
+                <p:cNvPr id="78" name="Gruppieren 77">
+                  <a:extLst>
+                    <a:ext uri="{FF2B5EF4-FFF2-40B4-BE49-F238E27FC236}">
+                      <a16:creationId xmlns:a16="http://schemas.microsoft.com/office/drawing/2014/main" id="{41DCEBD5-4F73-47A8-A61B-D82A3FEAD5A5}"/>
+                    </a:ext>
+                  </a:extLst>
+                </p:cNvPr>
+                <p:cNvGrpSpPr/>
+                <p:nvPr/>
+              </p:nvGrpSpPr>
+              <p:grpSpPr>
+                <a:xfrm>
+                  <a:off x="2419611" y="2104376"/>
+                  <a:ext cx="7352777" cy="3458265"/>
+                  <a:chOff x="513567" y="1350589"/>
+                  <a:chExt cx="7200627" cy="4055477"/>
+                </a:xfrm>
+              </p:grpSpPr>
+              <p:cxnSp>
+                <p:nvCxnSpPr>
+                  <p:cNvPr id="71" name="Gerade Verbindung mit Pfeil 70">
+                    <a:extLst>
+                      <a:ext uri="{FF2B5EF4-FFF2-40B4-BE49-F238E27FC236}">
+                        <a16:creationId xmlns:a16="http://schemas.microsoft.com/office/drawing/2014/main" id="{4BF812FB-9F03-40EE-8FDB-16E8ACEA4103}"/>
+                      </a:ext>
+                    </a:extLst>
+                  </p:cNvPr>
+                  <p:cNvCxnSpPr>
+                    <a:cxnSpLocks/>
+                    <a:stCxn id="43" idx="3"/>
+                    <a:endCxn id="34" idx="2"/>
+                  </p:cNvCxnSpPr>
+                  <p:nvPr/>
+                </p:nvCxnSpPr>
+                <p:spPr>
+                  <a:xfrm flipV="1">
+                    <a:off x="2179529" y="3378327"/>
+                    <a:ext cx="2589256" cy="1636301"/>
+                  </a:xfrm>
+                  <a:prstGeom prst="straightConnector1">
+                    <a:avLst/>
+                  </a:prstGeom>
+                  <a:ln w="12700">
+                    <a:solidFill>
+                      <a:schemeClr val="tx1"/>
+                    </a:solidFill>
+                    <a:prstDash val="solid"/>
+                    <a:tailEnd type="triangle"/>
+                  </a:ln>
+                </p:spPr>
+                <p:style>
+                  <a:lnRef idx="1">
+                    <a:schemeClr val="accent1"/>
+                  </a:lnRef>
+                  <a:fillRef idx="0">
+                    <a:schemeClr val="accent1"/>
+                  </a:fillRef>
+                  <a:effectRef idx="0">
+                    <a:schemeClr val="accent1"/>
+                  </a:effectRef>
+                  <a:fontRef idx="minor">
+                    <a:schemeClr val="tx1"/>
+                  </a:fontRef>
+                </p:style>
+              </p:cxnSp>
+              <p:cxnSp>
+                <p:nvCxnSpPr>
+                  <p:cNvPr id="65" name="Gerade Verbindung mit Pfeil 64">
+                    <a:extLst>
+                      <a:ext uri="{FF2B5EF4-FFF2-40B4-BE49-F238E27FC236}">
+                        <a16:creationId xmlns:a16="http://schemas.microsoft.com/office/drawing/2014/main" id="{601D02E0-C5FF-455F-B59F-D3FB5AA9965E}"/>
+                      </a:ext>
+                    </a:extLst>
+                  </p:cNvPr>
+                  <p:cNvCxnSpPr>
+                    <a:cxnSpLocks/>
+                    <a:stCxn id="39" idx="3"/>
+                    <a:endCxn id="34" idx="2"/>
+                  </p:cNvCxnSpPr>
+                  <p:nvPr/>
+                </p:nvCxnSpPr>
+                <p:spPr>
+                  <a:xfrm flipV="1">
+                    <a:off x="2179529" y="3378327"/>
+                    <a:ext cx="2589256" cy="1"/>
+                  </a:xfrm>
+                  <a:prstGeom prst="straightConnector1">
+                    <a:avLst/>
+                  </a:prstGeom>
+                  <a:ln w="12700">
+                    <a:solidFill>
+                      <a:schemeClr val="tx1"/>
+                    </a:solidFill>
+                    <a:prstDash val="solid"/>
+                    <a:tailEnd type="triangle"/>
+                  </a:ln>
+                </p:spPr>
+                <p:style>
+                  <a:lnRef idx="1">
+                    <a:schemeClr val="accent1"/>
+                  </a:lnRef>
+                  <a:fillRef idx="0">
+                    <a:schemeClr val="accent1"/>
+                  </a:fillRef>
+                  <a:effectRef idx="0">
+                    <a:schemeClr val="accent1"/>
+                  </a:effectRef>
+                  <a:fontRef idx="minor">
+                    <a:schemeClr val="tx1"/>
+                  </a:fontRef>
+                </p:style>
+              </p:cxnSp>
+              <p:sp>
+                <p:nvSpPr>
+                  <p:cNvPr id="5" name="Rechteck: abgerundete Ecken 4">
+                    <a:extLst>
+                      <a:ext uri="{FF2B5EF4-FFF2-40B4-BE49-F238E27FC236}">
+                        <a16:creationId xmlns:a16="http://schemas.microsoft.com/office/drawing/2014/main" id="{3211CC22-5277-496F-BEF8-C1E1D0A13D4C}"/>
+                      </a:ext>
+                    </a:extLst>
+                  </p:cNvPr>
+                  <p:cNvSpPr/>
+                  <p:nvPr/>
+                </p:nvSpPr>
+                <p:spPr>
+                  <a:xfrm>
+                    <a:off x="513567" y="1350589"/>
+                    <a:ext cx="1665962" cy="782877"/>
+                  </a:xfrm>
+                  <a:prstGeom prst="roundRect">
+                    <a:avLst/>
+                  </a:prstGeom>
+                  <a:ln w="19050">
+                    <a:solidFill>
+                      <a:schemeClr val="accent1"/>
+                    </a:solidFill>
+                  </a:ln>
+                </p:spPr>
+                <p:style>
+                  <a:lnRef idx="2">
+                    <a:schemeClr val="accent3">
+                      <a:shade val="50000"/>
+                    </a:schemeClr>
+                  </a:lnRef>
+                  <a:fillRef idx="1">
+                    <a:schemeClr val="accent3"/>
+                  </a:fillRef>
+                  <a:effectRef idx="0">
+                    <a:schemeClr val="accent3"/>
+                  </a:effectRef>
+                  <a:fontRef idx="minor">
+                    <a:schemeClr val="lt1"/>
+                  </a:fontRef>
+                </p:style>
+                <p:txBody>
+                  <a:bodyPr rtlCol="0" anchor="ctr"/>
+                  <a:lstStyle/>
+                  <a:p>
+                    <a:pPr algn="ctr"/>
+                    <a:r>
+                      <a:rPr lang="de-DE" sz="1600" dirty="0">
+                        <a:solidFill>
+                          <a:schemeClr val="tx1"/>
+                        </a:solidFill>
+                        <a:latin typeface="3270 Nerd Font" panose="02000509000000000000" pitchFamily="49" charset="0"/>
+                        <a:ea typeface="3270 Nerd Font" panose="02000509000000000000" pitchFamily="49" charset="0"/>
+                        <a:cs typeface="3270 Nerd Font" panose="02000509000000000000" pitchFamily="49" charset="0"/>
+                      </a:rPr>
+                      <a:t>CNC</a:t>
+                    </a:r>
+                  </a:p>
+                  <a:p>
+                    <a:pPr algn="ctr"/>
+                    <a:r>
+                      <a:rPr lang="de-DE" sz="1600" dirty="0">
+                        <a:solidFill>
+                          <a:schemeClr val="tx1"/>
+                        </a:solidFill>
+                        <a:latin typeface="3270 Nerd Font" panose="02000509000000000000" pitchFamily="49" charset="0"/>
+                        <a:ea typeface="3270 Nerd Font" panose="02000509000000000000" pitchFamily="49" charset="0"/>
+                        <a:cs typeface="3270 Nerd Font" panose="02000509000000000000" pitchFamily="49" charset="0"/>
+                      </a:rPr>
+                      <a:t>ID = 1001</a:t>
+                    </a:r>
+                    <a:endParaRPr lang="en-US" sz="1600" dirty="0">
+                      <a:solidFill>
+                        <a:schemeClr val="tx1"/>
+                      </a:solidFill>
+                      <a:latin typeface="3270 Nerd Font" panose="02000509000000000000" pitchFamily="49" charset="0"/>
+                      <a:ea typeface="3270 Nerd Font" panose="02000509000000000000" pitchFamily="49" charset="0"/>
+                      <a:cs typeface="3270 Nerd Font" panose="02000509000000000000" pitchFamily="49" charset="0"/>
+                    </a:endParaRPr>
+                  </a:p>
+                </p:txBody>
+              </p:sp>
+              <p:sp>
+                <p:nvSpPr>
+                  <p:cNvPr id="34" name="Flussdiagramm: Magnetplattenspeicher 33">
+                    <a:extLst>
+                      <a:ext uri="{FF2B5EF4-FFF2-40B4-BE49-F238E27FC236}">
+                        <a16:creationId xmlns:a16="http://schemas.microsoft.com/office/drawing/2014/main" id="{394DF2A6-08BB-41A2-B714-79D58C5BBEE7}"/>
+                      </a:ext>
+                    </a:extLst>
+                  </p:cNvPr>
+                  <p:cNvSpPr/>
+                  <p:nvPr/>
+                </p:nvSpPr>
+                <p:spPr>
+                  <a:xfrm>
+                    <a:off x="4768785" y="2951706"/>
+                    <a:ext cx="1419571" cy="853241"/>
+                  </a:xfrm>
+                  <a:prstGeom prst="flowChartMagneticDisk">
+                    <a:avLst/>
+                  </a:prstGeom>
+                  <a:solidFill>
+                    <a:schemeClr val="accent6">
+                      <a:lumMod val="40000"/>
+                      <a:lumOff val="60000"/>
+                    </a:schemeClr>
+                  </a:solidFill>
+                  <a:ln w="19050">
+                    <a:solidFill>
+                      <a:schemeClr val="accent1"/>
+                    </a:solidFill>
+                  </a:ln>
+                </p:spPr>
+                <p:style>
+                  <a:lnRef idx="2">
+                    <a:schemeClr val="accent1">
+                      <a:shade val="50000"/>
+                    </a:schemeClr>
+                  </a:lnRef>
+                  <a:fillRef idx="1">
+                    <a:schemeClr val="accent1"/>
+                  </a:fillRef>
+                  <a:effectRef idx="0">
+                    <a:schemeClr val="accent1"/>
+                  </a:effectRef>
+                  <a:fontRef idx="minor">
+                    <a:schemeClr val="lt1"/>
+                  </a:fontRef>
+                </p:style>
+                <p:txBody>
+                  <a:bodyPr rtlCol="0" anchor="ctr"/>
+                  <a:lstStyle/>
+                  <a:p>
+                    <a:pPr algn="ctr"/>
+                    <a:r>
+                      <a:rPr lang="de-DE" sz="1600" dirty="0" err="1">
+                        <a:solidFill>
+                          <a:schemeClr val="tx1"/>
+                        </a:solidFill>
+                        <a:latin typeface="3270 Nerd Font" panose="02000509000000000000" pitchFamily="49" charset="0"/>
+                        <a:ea typeface="3270 Nerd Font" panose="02000509000000000000" pitchFamily="49" charset="0"/>
+                        <a:cs typeface="3270 Nerd Font" panose="02000509000000000000" pitchFamily="49" charset="0"/>
+                      </a:rPr>
+                      <a:t>PostgresDB</a:t>
+                    </a:r>
+                    <a:endParaRPr lang="en-US" sz="1600" dirty="0">
+                      <a:solidFill>
+                        <a:schemeClr val="tx1"/>
+                      </a:solidFill>
+                      <a:latin typeface="3270 Nerd Font" panose="02000509000000000000" pitchFamily="49" charset="0"/>
+                      <a:ea typeface="3270 Nerd Font" panose="02000509000000000000" pitchFamily="49" charset="0"/>
+                      <a:cs typeface="3270 Nerd Font" panose="02000509000000000000" pitchFamily="49" charset="0"/>
+                    </a:endParaRPr>
+                  </a:p>
+                </p:txBody>
+              </p:sp>
+              <p:sp>
+                <p:nvSpPr>
+                  <p:cNvPr id="39" name="Rechteck: abgerundete Ecken 38">
+                    <a:extLst>
+                      <a:ext uri="{FF2B5EF4-FFF2-40B4-BE49-F238E27FC236}">
+                        <a16:creationId xmlns:a16="http://schemas.microsoft.com/office/drawing/2014/main" id="{BD6BE368-F097-4BC7-81A9-0BB1B2783D04}"/>
+                      </a:ext>
+                    </a:extLst>
+                  </p:cNvPr>
+                  <p:cNvSpPr/>
+                  <p:nvPr/>
+                </p:nvSpPr>
+                <p:spPr>
+                  <a:xfrm>
+                    <a:off x="513567" y="2986889"/>
+                    <a:ext cx="1665962" cy="782877"/>
+                  </a:xfrm>
+                  <a:prstGeom prst="roundRect">
+                    <a:avLst/>
+                  </a:prstGeom>
+                  <a:ln w="19050">
+                    <a:solidFill>
+                      <a:schemeClr val="accent1"/>
+                    </a:solidFill>
+                  </a:ln>
+                </p:spPr>
+                <p:style>
+                  <a:lnRef idx="2">
+                    <a:schemeClr val="accent3">
+                      <a:shade val="50000"/>
+                    </a:schemeClr>
+                  </a:lnRef>
+                  <a:fillRef idx="1">
+                    <a:schemeClr val="accent3"/>
+                  </a:fillRef>
+                  <a:effectRef idx="0">
+                    <a:schemeClr val="accent3"/>
+                  </a:effectRef>
+                  <a:fontRef idx="minor">
+                    <a:schemeClr val="lt1"/>
+                  </a:fontRef>
+                </p:style>
+                <p:txBody>
+                  <a:bodyPr rtlCol="0" anchor="ctr"/>
+                  <a:lstStyle/>
+                  <a:p>
+                    <a:pPr algn="ctr"/>
+                    <a:r>
+                      <a:rPr lang="de-DE" sz="1600" dirty="0">
+                        <a:solidFill>
+                          <a:schemeClr val="tx1"/>
+                        </a:solidFill>
+                        <a:latin typeface="3270 Nerd Font" panose="02000509000000000000" pitchFamily="49" charset="0"/>
+                        <a:ea typeface="3270 Nerd Font" panose="02000509000000000000" pitchFamily="49" charset="0"/>
+                        <a:cs typeface="3270 Nerd Font" panose="02000509000000000000" pitchFamily="49" charset="0"/>
+                      </a:rPr>
+                      <a:t>Assembly Robot</a:t>
+                    </a:r>
+                  </a:p>
+                  <a:p>
+                    <a:pPr algn="ctr"/>
+                    <a:r>
+                      <a:rPr lang="de-DE" sz="1600" dirty="0">
+                        <a:solidFill>
+                          <a:schemeClr val="tx1"/>
+                        </a:solidFill>
+                        <a:latin typeface="3270 Nerd Font" panose="02000509000000000000" pitchFamily="49" charset="0"/>
+                        <a:ea typeface="3270 Nerd Font" panose="02000509000000000000" pitchFamily="49" charset="0"/>
+                        <a:cs typeface="3270 Nerd Font" panose="02000509000000000000" pitchFamily="49" charset="0"/>
+                      </a:rPr>
+                      <a:t>ID = 1002</a:t>
+                    </a:r>
+                    <a:endParaRPr lang="en-US" sz="1600" dirty="0">
+                      <a:solidFill>
+                        <a:schemeClr val="tx1"/>
+                      </a:solidFill>
+                      <a:latin typeface="3270 Nerd Font" panose="02000509000000000000" pitchFamily="49" charset="0"/>
+                      <a:ea typeface="3270 Nerd Font" panose="02000509000000000000" pitchFamily="49" charset="0"/>
+                      <a:cs typeface="3270 Nerd Font" panose="02000509000000000000" pitchFamily="49" charset="0"/>
+                    </a:endParaRPr>
+                  </a:p>
+                </p:txBody>
+              </p:sp>
+              <p:sp>
+                <p:nvSpPr>
+                  <p:cNvPr id="43" name="Rechteck: abgerundete Ecken 42">
+                    <a:extLst>
+                      <a:ext uri="{FF2B5EF4-FFF2-40B4-BE49-F238E27FC236}">
+                        <a16:creationId xmlns:a16="http://schemas.microsoft.com/office/drawing/2014/main" id="{7D4571DE-A638-41B0-A92B-25AC377D5EEF}"/>
+                      </a:ext>
+                    </a:extLst>
+                  </p:cNvPr>
+                  <p:cNvSpPr/>
+                  <p:nvPr/>
+                </p:nvSpPr>
+                <p:spPr>
+                  <a:xfrm>
+                    <a:off x="513567" y="4623189"/>
+                    <a:ext cx="1665962" cy="782877"/>
+                  </a:xfrm>
+                  <a:prstGeom prst="roundRect">
+                    <a:avLst/>
+                  </a:prstGeom>
+                  <a:ln w="19050">
+                    <a:solidFill>
+                      <a:schemeClr val="accent1"/>
+                    </a:solidFill>
+                  </a:ln>
+                </p:spPr>
+                <p:style>
+                  <a:lnRef idx="2">
+                    <a:schemeClr val="accent3">
+                      <a:shade val="50000"/>
+                    </a:schemeClr>
+                  </a:lnRef>
+                  <a:fillRef idx="1">
+                    <a:schemeClr val="accent3"/>
+                  </a:fillRef>
+                  <a:effectRef idx="0">
+                    <a:schemeClr val="accent3"/>
+                  </a:effectRef>
+                  <a:fontRef idx="minor">
+                    <a:schemeClr val="lt1"/>
+                  </a:fontRef>
+                </p:style>
+                <p:txBody>
+                  <a:bodyPr rtlCol="0" anchor="ctr"/>
+                  <a:lstStyle/>
+                  <a:p>
+                    <a:pPr algn="ctr"/>
+                    <a:r>
+                      <a:rPr lang="de-DE" sz="1600" dirty="0" err="1">
+                        <a:solidFill>
+                          <a:schemeClr val="tx1"/>
+                        </a:solidFill>
+                        <a:latin typeface="3270 Nerd Font" panose="02000509000000000000" pitchFamily="49" charset="0"/>
+                        <a:ea typeface="3270 Nerd Font" panose="02000509000000000000" pitchFamily="49" charset="0"/>
+                        <a:cs typeface="3270 Nerd Font" panose="02000509000000000000" pitchFamily="49" charset="0"/>
+                      </a:rPr>
+                      <a:t>Packaging</a:t>
+                    </a:r>
+                    <a:endParaRPr lang="de-DE" sz="1600" dirty="0">
+                      <a:solidFill>
+                        <a:schemeClr val="tx1"/>
+                      </a:solidFill>
+                      <a:latin typeface="3270 Nerd Font" panose="02000509000000000000" pitchFamily="49" charset="0"/>
+                      <a:ea typeface="3270 Nerd Font" panose="02000509000000000000" pitchFamily="49" charset="0"/>
+                      <a:cs typeface="3270 Nerd Font" panose="02000509000000000000" pitchFamily="49" charset="0"/>
+                    </a:endParaRPr>
+                  </a:p>
+                  <a:p>
+                    <a:pPr algn="ctr"/>
+                    <a:r>
+                      <a:rPr lang="de-DE" sz="1600" dirty="0">
+                        <a:solidFill>
+                          <a:schemeClr val="tx1"/>
+                        </a:solidFill>
+                        <a:latin typeface="3270 Nerd Font" panose="02000509000000000000" pitchFamily="49" charset="0"/>
+                        <a:ea typeface="3270 Nerd Font" panose="02000509000000000000" pitchFamily="49" charset="0"/>
+                        <a:cs typeface="3270 Nerd Font" panose="02000509000000000000" pitchFamily="49" charset="0"/>
+                      </a:rPr>
+                      <a:t>ID = 1003</a:t>
+                    </a:r>
+                    <a:endParaRPr lang="en-US" sz="1600" dirty="0">
+                      <a:solidFill>
+                        <a:schemeClr val="tx1"/>
+                      </a:solidFill>
+                      <a:latin typeface="3270 Nerd Font" panose="02000509000000000000" pitchFamily="49" charset="0"/>
+                      <a:ea typeface="3270 Nerd Font" panose="02000509000000000000" pitchFamily="49" charset="0"/>
+                      <a:cs typeface="3270 Nerd Font" panose="02000509000000000000" pitchFamily="49" charset="0"/>
+                    </a:endParaRPr>
+                  </a:p>
+                </p:txBody>
+              </p:sp>
+              <p:cxnSp>
+                <p:nvCxnSpPr>
+                  <p:cNvPr id="14" name="Gerade Verbindung mit Pfeil 13">
+                    <a:extLst>
+                      <a:ext uri="{FF2B5EF4-FFF2-40B4-BE49-F238E27FC236}">
+                        <a16:creationId xmlns:a16="http://schemas.microsoft.com/office/drawing/2014/main" id="{E0380100-0D6A-4C71-A604-EFE65A9535AB}"/>
+                      </a:ext>
+                    </a:extLst>
+                  </p:cNvPr>
+                  <p:cNvCxnSpPr>
+                    <a:stCxn id="5" idx="3"/>
+                    <a:endCxn id="3" idx="2"/>
+                  </p:cNvCxnSpPr>
+                  <p:nvPr/>
+                </p:nvCxnSpPr>
+                <p:spPr>
+                  <a:xfrm>
+                    <a:off x="2179529" y="1742028"/>
+                    <a:ext cx="1063418" cy="1636299"/>
+                  </a:xfrm>
+                  <a:prstGeom prst="straightConnector1">
+                    <a:avLst/>
+                  </a:prstGeom>
+                  <a:ln w="12700">
+                    <a:solidFill>
+                      <a:srgbClr val="FF0000"/>
+                    </a:solidFill>
+                    <a:prstDash val="dash"/>
+                    <a:tailEnd type="triangle"/>
+                  </a:ln>
+                </p:spPr>
+                <p:style>
+                  <a:lnRef idx="1">
+                    <a:schemeClr val="accent1"/>
+                  </a:lnRef>
+                  <a:fillRef idx="0">
+                    <a:schemeClr val="accent1"/>
+                  </a:fillRef>
+                  <a:effectRef idx="0">
+                    <a:schemeClr val="accent1"/>
+                  </a:effectRef>
+                  <a:fontRef idx="minor">
+                    <a:schemeClr val="tx1"/>
+                  </a:fontRef>
+                </p:style>
+              </p:cxnSp>
+              <p:cxnSp>
+                <p:nvCxnSpPr>
+                  <p:cNvPr id="47" name="Gerade Verbindung mit Pfeil 46">
+                    <a:extLst>
+                      <a:ext uri="{FF2B5EF4-FFF2-40B4-BE49-F238E27FC236}">
+                        <a16:creationId xmlns:a16="http://schemas.microsoft.com/office/drawing/2014/main" id="{87EA4073-4CD1-4C68-A627-F778B7C7450D}"/>
+                      </a:ext>
+                    </a:extLst>
+                  </p:cNvPr>
+                  <p:cNvCxnSpPr>
+                    <a:cxnSpLocks/>
+                    <a:stCxn id="39" idx="2"/>
+                    <a:endCxn id="43" idx="0"/>
+                  </p:cNvCxnSpPr>
+                  <p:nvPr/>
+                </p:nvCxnSpPr>
+                <p:spPr>
+                  <a:xfrm>
+                    <a:off x="1346548" y="3769766"/>
+                    <a:ext cx="0" cy="853423"/>
+                  </a:xfrm>
+                  <a:prstGeom prst="straightConnector1">
+                    <a:avLst/>
+                  </a:prstGeom>
+                  <a:ln w="12700">
+                    <a:solidFill>
+                      <a:srgbClr val="FF0000"/>
+                    </a:solidFill>
+                    <a:prstDash val="dash"/>
+                    <a:tailEnd type="triangle"/>
+                  </a:ln>
+                </p:spPr>
+                <p:style>
+                  <a:lnRef idx="1">
+                    <a:schemeClr val="accent1"/>
+                  </a:lnRef>
+                  <a:fillRef idx="0">
+                    <a:schemeClr val="accent1"/>
+                  </a:fillRef>
+                  <a:effectRef idx="0">
+                    <a:schemeClr val="accent1"/>
+                  </a:effectRef>
+                  <a:fontRef idx="minor">
+                    <a:schemeClr val="tx1"/>
+                  </a:fontRef>
+                </p:style>
+              </p:cxnSp>
+              <p:cxnSp>
+                <p:nvCxnSpPr>
+                  <p:cNvPr id="48" name="Gerade Verbindung mit Pfeil 47">
+                    <a:extLst>
+                      <a:ext uri="{FF2B5EF4-FFF2-40B4-BE49-F238E27FC236}">
+                        <a16:creationId xmlns:a16="http://schemas.microsoft.com/office/drawing/2014/main" id="{97DF5005-5983-44BA-A2D3-B12A8D82CCD0}"/>
+                      </a:ext>
+                    </a:extLst>
+                  </p:cNvPr>
+                  <p:cNvCxnSpPr>
+                    <a:cxnSpLocks/>
+                    <a:stCxn id="5" idx="2"/>
+                    <a:endCxn id="39" idx="0"/>
+                  </p:cNvCxnSpPr>
+                  <p:nvPr/>
+                </p:nvCxnSpPr>
+                <p:spPr>
+                  <a:xfrm>
+                    <a:off x="1346548" y="2133466"/>
+                    <a:ext cx="0" cy="853423"/>
+                  </a:xfrm>
+                  <a:prstGeom prst="straightConnector1">
+                    <a:avLst/>
+                  </a:prstGeom>
+                  <a:ln w="12700">
+                    <a:solidFill>
+                      <a:srgbClr val="FF0000"/>
+                    </a:solidFill>
+                    <a:prstDash val="dash"/>
+                    <a:tailEnd type="triangle"/>
+                  </a:ln>
+                </p:spPr>
+                <p:style>
+                  <a:lnRef idx="1">
+                    <a:schemeClr val="accent1"/>
+                  </a:lnRef>
+                  <a:fillRef idx="0">
+                    <a:schemeClr val="accent1"/>
+                  </a:fillRef>
+                  <a:effectRef idx="0">
+                    <a:schemeClr val="accent1"/>
+                  </a:effectRef>
+                  <a:fontRef idx="minor">
+                    <a:schemeClr val="tx1"/>
+                  </a:fontRef>
+                </p:style>
+              </p:cxnSp>
+              <p:cxnSp>
+                <p:nvCxnSpPr>
+                  <p:cNvPr id="49" name="Gerade Verbindung mit Pfeil 48">
+                    <a:extLst>
+                      <a:ext uri="{FF2B5EF4-FFF2-40B4-BE49-F238E27FC236}">
+                        <a16:creationId xmlns:a16="http://schemas.microsoft.com/office/drawing/2014/main" id="{11FF5F50-76CA-4304-AAC3-B4BEEC1C35E8}"/>
+                      </a:ext>
+                    </a:extLst>
+                  </p:cNvPr>
+                  <p:cNvCxnSpPr>
+                    <a:cxnSpLocks/>
+                    <a:stCxn id="39" idx="3"/>
+                    <a:endCxn id="3" idx="2"/>
+                  </p:cNvCxnSpPr>
+                  <p:nvPr/>
+                </p:nvCxnSpPr>
+                <p:spPr>
+                  <a:xfrm flipV="1">
+                    <a:off x="2179529" y="3378327"/>
+                    <a:ext cx="1063418" cy="1"/>
+                  </a:xfrm>
+                  <a:prstGeom prst="straightConnector1">
+                    <a:avLst/>
+                  </a:prstGeom>
+                  <a:ln w="12700">
+                    <a:solidFill>
+                      <a:srgbClr val="FF0000"/>
+                    </a:solidFill>
+                    <a:prstDash val="dash"/>
+                    <a:tailEnd type="triangle"/>
+                  </a:ln>
+                </p:spPr>
+                <p:style>
+                  <a:lnRef idx="1">
+                    <a:schemeClr val="accent1"/>
+                  </a:lnRef>
+                  <a:fillRef idx="0">
+                    <a:schemeClr val="accent1"/>
+                  </a:fillRef>
+                  <a:effectRef idx="0">
+                    <a:schemeClr val="accent1"/>
+                  </a:effectRef>
+                  <a:fontRef idx="minor">
+                    <a:schemeClr val="tx1"/>
+                  </a:fontRef>
+                </p:style>
+              </p:cxnSp>
+              <p:cxnSp>
+                <p:nvCxnSpPr>
+                  <p:cNvPr id="50" name="Gerade Verbindung mit Pfeil 49">
+                    <a:extLst>
+                      <a:ext uri="{FF2B5EF4-FFF2-40B4-BE49-F238E27FC236}">
+                        <a16:creationId xmlns:a16="http://schemas.microsoft.com/office/drawing/2014/main" id="{2D678D2E-21B5-479B-9EEC-E253157DDDE7}"/>
+                      </a:ext>
+                    </a:extLst>
+                  </p:cNvPr>
+                  <p:cNvCxnSpPr>
+                    <a:cxnSpLocks/>
+                    <a:stCxn id="43" idx="3"/>
+                    <a:endCxn id="3" idx="2"/>
+                  </p:cNvCxnSpPr>
+                  <p:nvPr/>
+                </p:nvCxnSpPr>
+                <p:spPr>
+                  <a:xfrm flipV="1">
+                    <a:off x="2179529" y="3378327"/>
+                    <a:ext cx="1063418" cy="1636301"/>
+                  </a:xfrm>
+                  <a:prstGeom prst="straightConnector1">
+                    <a:avLst/>
+                  </a:prstGeom>
+                  <a:ln w="12700">
+                    <a:solidFill>
+                      <a:srgbClr val="FF0000"/>
+                    </a:solidFill>
+                    <a:prstDash val="dash"/>
+                    <a:tailEnd type="triangle"/>
+                  </a:ln>
+                </p:spPr>
+                <p:style>
+                  <a:lnRef idx="1">
+                    <a:schemeClr val="accent1"/>
+                  </a:lnRef>
+                  <a:fillRef idx="0">
+                    <a:schemeClr val="accent1"/>
+                  </a:fillRef>
+                  <a:effectRef idx="0">
+                    <a:schemeClr val="accent1"/>
+                  </a:effectRef>
+                  <a:fontRef idx="minor">
+                    <a:schemeClr val="tx1"/>
+                  </a:fontRef>
+                </p:style>
+              </p:cxnSp>
+              <p:sp>
+                <p:nvSpPr>
+                  <p:cNvPr id="26" name="Rechteck 25">
+                    <a:extLst>
+                      <a:ext uri="{FF2B5EF4-FFF2-40B4-BE49-F238E27FC236}">
+                        <a16:creationId xmlns:a16="http://schemas.microsoft.com/office/drawing/2014/main" id="{293A5319-911C-4D05-A0F8-B92254D37045}"/>
+                      </a:ext>
+                    </a:extLst>
+                  </p:cNvPr>
+                  <p:cNvSpPr/>
+                  <p:nvPr/>
+                </p:nvSpPr>
+                <p:spPr>
+                  <a:xfrm>
+                    <a:off x="2173957" y="3172218"/>
+                    <a:ext cx="931104" cy="173152"/>
+                  </a:xfrm>
+                  <a:prstGeom prst="rect">
+                    <a:avLst/>
+                  </a:prstGeom>
+                  <a:noFill/>
+                  <a:ln>
+                    <a:noFill/>
+                  </a:ln>
+                </p:spPr>
+                <p:style>
+                  <a:lnRef idx="2">
+                    <a:schemeClr val="accent1">
+                      <a:shade val="50000"/>
+                    </a:schemeClr>
+                  </a:lnRef>
+                  <a:fillRef idx="1">
+                    <a:schemeClr val="accent1"/>
+                  </a:fillRef>
+                  <a:effectRef idx="0">
+                    <a:schemeClr val="accent1"/>
+                  </a:effectRef>
+                  <a:fontRef idx="minor">
+                    <a:schemeClr val="lt1"/>
+                  </a:fontRef>
+                </p:style>
+                <p:txBody>
+                  <a:bodyPr rtlCol="0" anchor="ctr"/>
+                  <a:lstStyle/>
+                  <a:p>
+                    <a:pPr algn="ctr"/>
+                    <a:r>
+                      <a:rPr lang="en-US" sz="800" dirty="0">
+                        <a:solidFill>
+                          <a:schemeClr val="tx1"/>
+                        </a:solidFill>
+                        <a:latin typeface="3270 Nerd Font" panose="02000509000000000000" pitchFamily="49" charset="0"/>
+                        <a:ea typeface="3270 Nerd Font" panose="02000509000000000000" pitchFamily="49" charset="0"/>
+                        <a:cs typeface="3270 Nerd Font" panose="02000509000000000000" pitchFamily="49" charset="0"/>
+                      </a:rPr>
+                      <a:t>Pass Features</a:t>
+                    </a:r>
+                  </a:p>
+                </p:txBody>
+              </p:sp>
+              <p:cxnSp>
+                <p:nvCxnSpPr>
+                  <p:cNvPr id="56" name="Gerade Verbindung mit Pfeil 55">
+                    <a:extLst>
+                      <a:ext uri="{FF2B5EF4-FFF2-40B4-BE49-F238E27FC236}">
+                        <a16:creationId xmlns:a16="http://schemas.microsoft.com/office/drawing/2014/main" id="{93BD2CE4-6DCD-4AA4-B403-9F3789879DCD}"/>
+                      </a:ext>
+                    </a:extLst>
+                  </p:cNvPr>
+                  <p:cNvCxnSpPr>
+                    <a:cxnSpLocks/>
+                    <a:stCxn id="3" idx="6"/>
+                    <a:endCxn id="34" idx="2"/>
+                  </p:cNvCxnSpPr>
+                  <p:nvPr/>
+                </p:nvCxnSpPr>
+                <p:spPr>
+                  <a:xfrm>
+                    <a:off x="3853049" y="3378327"/>
+                    <a:ext cx="915736" cy="0"/>
+                  </a:xfrm>
+                  <a:prstGeom prst="straightConnector1">
+                    <a:avLst/>
+                  </a:prstGeom>
+                  <a:ln w="12700">
+                    <a:solidFill>
+                      <a:schemeClr val="tx1"/>
+                    </a:solidFill>
+                    <a:prstDash val="solid"/>
+                    <a:tailEnd type="triangle"/>
+                  </a:ln>
+                </p:spPr>
+                <p:style>
+                  <a:lnRef idx="1">
+                    <a:schemeClr val="accent1"/>
+                  </a:lnRef>
+                  <a:fillRef idx="0">
+                    <a:schemeClr val="accent1"/>
+                  </a:fillRef>
+                  <a:effectRef idx="0">
+                    <a:schemeClr val="accent1"/>
+                  </a:effectRef>
+                  <a:fontRef idx="minor">
+                    <a:schemeClr val="tx1"/>
+                  </a:fontRef>
+                </p:style>
+              </p:cxnSp>
+              <p:sp>
+                <p:nvSpPr>
+                  <p:cNvPr id="59" name="Rechteck 58">
+                    <a:extLst>
+                      <a:ext uri="{FF2B5EF4-FFF2-40B4-BE49-F238E27FC236}">
+                        <a16:creationId xmlns:a16="http://schemas.microsoft.com/office/drawing/2014/main" id="{CB080C01-29AD-4166-888D-985726EB6D84}"/>
+                      </a:ext>
+                    </a:extLst>
+                  </p:cNvPr>
+                  <p:cNvSpPr/>
+                  <p:nvPr/>
+                </p:nvSpPr>
+                <p:spPr>
+                  <a:xfrm>
+                    <a:off x="3780774" y="3148658"/>
+                    <a:ext cx="856638" cy="206108"/>
+                  </a:xfrm>
+                  <a:prstGeom prst="rect">
+                    <a:avLst/>
+                  </a:prstGeom>
+                  <a:noFill/>
+                  <a:ln>
+                    <a:noFill/>
+                  </a:ln>
+                </p:spPr>
+                <p:style>
+                  <a:lnRef idx="2">
+                    <a:schemeClr val="accent1">
+                      <a:shade val="50000"/>
+                    </a:schemeClr>
+                  </a:lnRef>
+                  <a:fillRef idx="1">
+                    <a:schemeClr val="accent1"/>
+                  </a:fillRef>
+                  <a:effectRef idx="0">
+                    <a:schemeClr val="accent1"/>
+                  </a:effectRef>
+                  <a:fontRef idx="minor">
+                    <a:schemeClr val="lt1"/>
+                  </a:fontRef>
+                </p:style>
+                <p:txBody>
+                  <a:bodyPr rtlCol="0" anchor="ctr"/>
+                  <a:lstStyle/>
+                  <a:p>
+                    <a:pPr algn="ctr"/>
+                    <a:r>
+                      <a:rPr lang="en-US" sz="800" dirty="0">
+                        <a:solidFill>
+                          <a:schemeClr val="tx1"/>
+                        </a:solidFill>
+                        <a:latin typeface="3270 Nerd Font" panose="02000509000000000000" pitchFamily="49" charset="0"/>
+                        <a:ea typeface="3270 Nerd Font" panose="02000509000000000000" pitchFamily="49" charset="0"/>
+                        <a:cs typeface="3270 Nerd Font" panose="02000509000000000000" pitchFamily="49" charset="0"/>
+                      </a:rPr>
+                      <a:t>Update Prediction</a:t>
+                    </a:r>
+                  </a:p>
+                </p:txBody>
+              </p:sp>
+              <p:sp>
+                <p:nvSpPr>
+                  <p:cNvPr id="61" name="Rechteck 60">
+                    <a:extLst>
+                      <a:ext uri="{FF2B5EF4-FFF2-40B4-BE49-F238E27FC236}">
+                        <a16:creationId xmlns:a16="http://schemas.microsoft.com/office/drawing/2014/main" id="{6F9BBCD1-E360-4475-B604-C8F7A4841756}"/>
+                      </a:ext>
+                    </a:extLst>
+                  </p:cNvPr>
+                  <p:cNvSpPr/>
+                  <p:nvPr/>
+                </p:nvSpPr>
+                <p:spPr>
+                  <a:xfrm>
+                    <a:off x="547471" y="2455845"/>
+                    <a:ext cx="915736" cy="206108"/>
+                  </a:xfrm>
+                  <a:prstGeom prst="rect">
+                    <a:avLst/>
+                  </a:prstGeom>
+                  <a:noFill/>
+                  <a:ln>
+                    <a:noFill/>
+                  </a:ln>
+                </p:spPr>
+                <p:style>
+                  <a:lnRef idx="2">
+                    <a:schemeClr val="accent1">
+                      <a:shade val="50000"/>
+                    </a:schemeClr>
+                  </a:lnRef>
+                  <a:fillRef idx="1">
+                    <a:schemeClr val="accent1"/>
+                  </a:fillRef>
+                  <a:effectRef idx="0">
+                    <a:schemeClr val="accent1"/>
+                  </a:effectRef>
+                  <a:fontRef idx="minor">
+                    <a:schemeClr val="lt1"/>
+                  </a:fontRef>
+                </p:style>
+                <p:txBody>
+                  <a:bodyPr rtlCol="0" anchor="ctr"/>
+                  <a:lstStyle/>
+                  <a:p>
+                    <a:pPr algn="ctr"/>
+                    <a:r>
+                      <a:rPr lang="en-US" sz="800" dirty="0">
+                        <a:solidFill>
+                          <a:schemeClr val="tx1"/>
+                        </a:solidFill>
+                        <a:latin typeface="3270 Nerd Font" panose="02000509000000000000" pitchFamily="49" charset="0"/>
+                        <a:ea typeface="3270 Nerd Font" panose="02000509000000000000" pitchFamily="49" charset="0"/>
+                        <a:cs typeface="3270 Nerd Font" panose="02000509000000000000" pitchFamily="49" charset="0"/>
+                      </a:rPr>
+                      <a:t>Pass OBJ ID</a:t>
+                    </a:r>
+                  </a:p>
+                </p:txBody>
+              </p:sp>
+              <p:cxnSp>
+                <p:nvCxnSpPr>
+                  <p:cNvPr id="63" name="Gerade Verbindung mit Pfeil 62">
+                    <a:extLst>
+                      <a:ext uri="{FF2B5EF4-FFF2-40B4-BE49-F238E27FC236}">
+                        <a16:creationId xmlns:a16="http://schemas.microsoft.com/office/drawing/2014/main" id="{5449E521-8AD1-4983-B22D-CD813FC2D488}"/>
+                      </a:ext>
+                    </a:extLst>
+                  </p:cNvPr>
+                  <p:cNvCxnSpPr>
+                    <a:cxnSpLocks/>
+                    <a:stCxn id="5" idx="3"/>
+                    <a:endCxn id="34" idx="2"/>
+                  </p:cNvCxnSpPr>
+                  <p:nvPr/>
+                </p:nvCxnSpPr>
+                <p:spPr>
+                  <a:xfrm>
+                    <a:off x="2179529" y="1742028"/>
+                    <a:ext cx="2589256" cy="1636299"/>
+                  </a:xfrm>
+                  <a:prstGeom prst="straightConnector1">
+                    <a:avLst/>
+                  </a:prstGeom>
+                  <a:ln w="12700">
+                    <a:solidFill>
+                      <a:schemeClr val="tx1"/>
+                    </a:solidFill>
+                    <a:prstDash val="solid"/>
+                    <a:tailEnd type="triangle"/>
+                  </a:ln>
+                </p:spPr>
+                <p:style>
+                  <a:lnRef idx="1">
+                    <a:schemeClr val="accent1"/>
+                  </a:lnRef>
+                  <a:fillRef idx="0">
+                    <a:schemeClr val="accent1"/>
+                  </a:fillRef>
+                  <a:effectRef idx="0">
+                    <a:schemeClr val="accent1"/>
+                  </a:effectRef>
+                  <a:fontRef idx="minor">
+                    <a:schemeClr val="tx1"/>
+                  </a:fontRef>
+                </p:style>
+              </p:cxnSp>
+              <p:sp>
+                <p:nvSpPr>
+                  <p:cNvPr id="3" name="Ellipse 2">
+                    <a:extLst>
+                      <a:ext uri="{FF2B5EF4-FFF2-40B4-BE49-F238E27FC236}">
+                        <a16:creationId xmlns:a16="http://schemas.microsoft.com/office/drawing/2014/main" id="{56F5D303-41D1-41B4-9140-0D16296D4B50}"/>
+                      </a:ext>
+                    </a:extLst>
+                  </p:cNvPr>
+                  <p:cNvSpPr/>
+                  <p:nvPr/>
+                </p:nvSpPr>
+                <p:spPr>
+                  <a:xfrm>
+                    <a:off x="3242947" y="1518212"/>
+                    <a:ext cx="610102" cy="3720230"/>
+                  </a:xfrm>
+                  <a:prstGeom prst="ellipse">
+                    <a:avLst/>
+                  </a:prstGeom>
+                  <a:solidFill>
+                    <a:schemeClr val="accent2">
+                      <a:lumMod val="60000"/>
+                      <a:lumOff val="40000"/>
+                    </a:schemeClr>
+                  </a:solidFill>
+                  <a:ln w="19050">
+                    <a:solidFill>
+                      <a:schemeClr val="accent1"/>
+                    </a:solidFill>
+                  </a:ln>
+                </p:spPr>
+                <p:style>
+                  <a:lnRef idx="2">
+                    <a:schemeClr val="accent2">
+                      <a:shade val="50000"/>
+                    </a:schemeClr>
+                  </a:lnRef>
+                  <a:fillRef idx="1">
+                    <a:schemeClr val="accent2"/>
+                  </a:fillRef>
+                  <a:effectRef idx="0">
+                    <a:schemeClr val="accent2"/>
+                  </a:effectRef>
+                  <a:fontRef idx="minor">
+                    <a:schemeClr val="lt1"/>
+                  </a:fontRef>
+                </p:style>
+                <p:txBody>
+                  <a:bodyPr vert="vert270" rtlCol="0" anchor="ctr"/>
+                  <a:lstStyle/>
+                  <a:p>
+                    <a:pPr algn="ctr"/>
+                    <a:r>
+                      <a:rPr lang="en-US" dirty="0">
+                        <a:solidFill>
+                          <a:schemeClr val="tx1"/>
+                        </a:solidFill>
+                        <a:latin typeface="3270 Nerd Font" panose="02000509000000000000" pitchFamily="49" charset="0"/>
+                        <a:ea typeface="3270 Nerd Font" panose="02000509000000000000" pitchFamily="49" charset="0"/>
+                        <a:cs typeface="3270 Nerd Font" panose="02000509000000000000" pitchFamily="49" charset="0"/>
+                      </a:rPr>
+                      <a:t>Decision Tree Layer</a:t>
+                    </a:r>
+                  </a:p>
+                </p:txBody>
+              </p:sp>
+              <p:sp>
+                <p:nvSpPr>
+                  <p:cNvPr id="72" name="Rechteck 71">
+                    <a:extLst>
+                      <a:ext uri="{FF2B5EF4-FFF2-40B4-BE49-F238E27FC236}">
+                        <a16:creationId xmlns:a16="http://schemas.microsoft.com/office/drawing/2014/main" id="{17AAD9C3-469D-4CC8-8CA1-9DC1750524FF}"/>
+                      </a:ext>
+                    </a:extLst>
+                  </p:cNvPr>
+                  <p:cNvSpPr/>
+                  <p:nvPr/>
+                </p:nvSpPr>
+                <p:spPr>
+                  <a:xfrm rot="1608456">
+                    <a:off x="2281682" y="1848593"/>
+                    <a:ext cx="1127509" cy="206108"/>
+                  </a:xfrm>
+                  <a:prstGeom prst="rect">
+                    <a:avLst/>
+                  </a:prstGeom>
+                  <a:noFill/>
+                  <a:ln>
+                    <a:noFill/>
+                  </a:ln>
+                </p:spPr>
+                <p:style>
+                  <a:lnRef idx="2">
+                    <a:schemeClr val="accent1">
+                      <a:shade val="50000"/>
+                    </a:schemeClr>
+                  </a:lnRef>
+                  <a:fillRef idx="1">
+                    <a:schemeClr val="accent1"/>
+                  </a:fillRef>
+                  <a:effectRef idx="0">
+                    <a:schemeClr val="accent1"/>
+                  </a:effectRef>
+                  <a:fontRef idx="minor">
+                    <a:schemeClr val="lt1"/>
+                  </a:fontRef>
+                </p:style>
+                <p:txBody>
+                  <a:bodyPr rtlCol="0" anchor="ctr"/>
+                  <a:lstStyle/>
+                  <a:p>
+                    <a:pPr algn="ctr"/>
+                    <a:r>
+                      <a:rPr lang="en-US" sz="800" dirty="0">
+                        <a:solidFill>
+                          <a:schemeClr val="tx1"/>
+                        </a:solidFill>
+                        <a:latin typeface="3270 Nerd Font" panose="02000509000000000000" pitchFamily="49" charset="0"/>
+                        <a:ea typeface="3270 Nerd Font" panose="02000509000000000000" pitchFamily="49" charset="0"/>
+                        <a:cs typeface="3270 Nerd Font" panose="02000509000000000000" pitchFamily="49" charset="0"/>
+                      </a:rPr>
+                      <a:t>Write to DB to keep real time</a:t>
+                    </a:r>
+                  </a:p>
+                </p:txBody>
+              </p:sp>
+              <p:sp>
+                <p:nvSpPr>
+                  <p:cNvPr id="73" name="Ellipse 72">
+                    <a:extLst>
+                      <a:ext uri="{FF2B5EF4-FFF2-40B4-BE49-F238E27FC236}">
+                        <a16:creationId xmlns:a16="http://schemas.microsoft.com/office/drawing/2014/main" id="{CA807400-AE24-4FA0-B2A8-3F04B22FDD3A}"/>
+                      </a:ext>
+                    </a:extLst>
+                  </p:cNvPr>
+                  <p:cNvSpPr/>
+                  <p:nvPr/>
+                </p:nvSpPr>
+                <p:spPr>
+                  <a:xfrm>
+                    <a:off x="7104092" y="1518212"/>
+                    <a:ext cx="610102" cy="3720230"/>
+                  </a:xfrm>
+                  <a:prstGeom prst="ellipse">
+                    <a:avLst/>
+                  </a:prstGeom>
+                  <a:solidFill>
+                    <a:schemeClr val="accent2">
+                      <a:lumMod val="60000"/>
+                      <a:lumOff val="40000"/>
+                    </a:schemeClr>
+                  </a:solidFill>
+                  <a:ln w="19050">
+                    <a:solidFill>
+                      <a:schemeClr val="accent1"/>
+                    </a:solidFill>
+                  </a:ln>
+                </p:spPr>
+                <p:style>
+                  <a:lnRef idx="2">
+                    <a:schemeClr val="accent2">
+                      <a:shade val="50000"/>
+                    </a:schemeClr>
+                  </a:lnRef>
+                  <a:fillRef idx="1">
+                    <a:schemeClr val="accent2"/>
+                  </a:fillRef>
+                  <a:effectRef idx="0">
+                    <a:schemeClr val="accent2"/>
+                  </a:effectRef>
+                  <a:fontRef idx="minor">
+                    <a:schemeClr val="lt1"/>
+                  </a:fontRef>
+                </p:style>
+                <p:txBody>
+                  <a:bodyPr vert="vert270" rtlCol="0" anchor="ctr"/>
+                  <a:lstStyle/>
+                  <a:p>
+                    <a:pPr algn="ctr"/>
+                    <a:r>
+                      <a:rPr lang="en-US" dirty="0">
+                        <a:solidFill>
+                          <a:schemeClr val="tx1"/>
+                        </a:solidFill>
+                        <a:latin typeface="3270 Nerd Font" panose="02000509000000000000" pitchFamily="49" charset="0"/>
+                        <a:ea typeface="3270 Nerd Font" panose="02000509000000000000" pitchFamily="49" charset="0"/>
+                        <a:cs typeface="3270 Nerd Font" panose="02000509000000000000" pitchFamily="49" charset="0"/>
+                      </a:rPr>
+                      <a:t>Final Neural Network</a:t>
+                    </a:r>
+                  </a:p>
+                </p:txBody>
+              </p:sp>
+              <p:cxnSp>
+                <p:nvCxnSpPr>
+                  <p:cNvPr id="74" name="Gerade Verbindung mit Pfeil 73">
+                    <a:extLst>
+                      <a:ext uri="{FF2B5EF4-FFF2-40B4-BE49-F238E27FC236}">
+                        <a16:creationId xmlns:a16="http://schemas.microsoft.com/office/drawing/2014/main" id="{79E3671A-02BF-4458-A590-F495EB4BD100}"/>
+                      </a:ext>
+                    </a:extLst>
+                  </p:cNvPr>
+                  <p:cNvCxnSpPr>
+                    <a:cxnSpLocks/>
+                    <a:stCxn id="34" idx="4"/>
+                    <a:endCxn id="73" idx="2"/>
+                  </p:cNvCxnSpPr>
+                  <p:nvPr/>
+                </p:nvCxnSpPr>
+                <p:spPr>
+                  <a:xfrm>
+                    <a:off x="6188356" y="3378327"/>
+                    <a:ext cx="915736" cy="0"/>
+                  </a:xfrm>
+                  <a:prstGeom prst="straightConnector1">
+                    <a:avLst/>
+                  </a:prstGeom>
+                  <a:ln w="12700">
+                    <a:solidFill>
+                      <a:schemeClr val="tx1"/>
+                    </a:solidFill>
+                    <a:prstDash val="solid"/>
+                    <a:tailEnd type="triangle"/>
+                  </a:ln>
+                </p:spPr>
+                <p:style>
+                  <a:lnRef idx="1">
+                    <a:schemeClr val="accent1"/>
+                  </a:lnRef>
+                  <a:fillRef idx="0">
+                    <a:schemeClr val="accent1"/>
+                  </a:fillRef>
+                  <a:effectRef idx="0">
+                    <a:schemeClr val="accent1"/>
+                  </a:effectRef>
+                  <a:fontRef idx="minor">
+                    <a:schemeClr val="tx1"/>
+                  </a:fontRef>
+                </p:style>
+              </p:cxnSp>
+              <p:sp>
+                <p:nvSpPr>
+                  <p:cNvPr id="76" name="Rechteck 75">
+                    <a:extLst>
+                      <a:ext uri="{FF2B5EF4-FFF2-40B4-BE49-F238E27FC236}">
+                        <a16:creationId xmlns:a16="http://schemas.microsoft.com/office/drawing/2014/main" id="{4EE3153A-C43E-48AE-B913-9786272D35A3}"/>
+                      </a:ext>
+                    </a:extLst>
+                  </p:cNvPr>
+                  <p:cNvSpPr/>
+                  <p:nvPr/>
+                </p:nvSpPr>
+                <p:spPr>
+                  <a:xfrm>
+                    <a:off x="6188356" y="3139262"/>
+                    <a:ext cx="915736" cy="206108"/>
+                  </a:xfrm>
+                  <a:prstGeom prst="rect">
+                    <a:avLst/>
+                  </a:prstGeom>
+                  <a:noFill/>
+                  <a:ln>
+                    <a:noFill/>
+                  </a:ln>
+                </p:spPr>
+                <p:style>
+                  <a:lnRef idx="2">
+                    <a:schemeClr val="accent1">
+                      <a:shade val="50000"/>
+                    </a:schemeClr>
+                  </a:lnRef>
+                  <a:fillRef idx="1">
+                    <a:schemeClr val="accent1"/>
+                  </a:fillRef>
+                  <a:effectRef idx="0">
+                    <a:schemeClr val="accent1"/>
+                  </a:effectRef>
+                  <a:fontRef idx="minor">
+                    <a:schemeClr val="lt1"/>
+                  </a:fontRef>
+                </p:style>
+                <p:txBody>
+                  <a:bodyPr rtlCol="0" anchor="ctr"/>
+                  <a:lstStyle/>
+                  <a:p>
+                    <a:pPr algn="ctr"/>
+                    <a:r>
+                      <a:rPr lang="en-US" sz="800" dirty="0">
+                        <a:solidFill>
+                          <a:schemeClr val="tx1"/>
+                        </a:solidFill>
+                        <a:latin typeface="3270 Nerd Font" panose="02000509000000000000" pitchFamily="49" charset="0"/>
+                        <a:ea typeface="3270 Nerd Font" panose="02000509000000000000" pitchFamily="49" charset="0"/>
+                        <a:cs typeface="3270 Nerd Font" panose="02000509000000000000" pitchFamily="49" charset="0"/>
+                      </a:rPr>
+                      <a:t>Concatenation &amp; </a:t>
+                    </a:r>
+                    <a:r>
+                      <a:rPr lang="en-US" sz="800" dirty="0" err="1">
+                        <a:solidFill>
+                          <a:schemeClr val="tx1"/>
+                        </a:solidFill>
+                        <a:latin typeface="3270 Nerd Font" panose="02000509000000000000" pitchFamily="49" charset="0"/>
+                        <a:ea typeface="3270 Nerd Font" panose="02000509000000000000" pitchFamily="49" charset="0"/>
+                        <a:cs typeface="3270 Nerd Font" panose="02000509000000000000" pitchFamily="49" charset="0"/>
+                      </a:rPr>
+                      <a:t>Prediciton</a:t>
+                    </a:r>
+                    <a:endParaRPr lang="en-US" sz="800" dirty="0">
+                      <a:solidFill>
+                        <a:schemeClr val="tx1"/>
+                      </a:solidFill>
+                      <a:latin typeface="3270 Nerd Font" panose="02000509000000000000" pitchFamily="49" charset="0"/>
+                      <a:ea typeface="3270 Nerd Font" panose="02000509000000000000" pitchFamily="49" charset="0"/>
+                      <a:cs typeface="3270 Nerd Font" panose="02000509000000000000" pitchFamily="49" charset="0"/>
+                    </a:endParaRPr>
+                  </a:p>
+                </p:txBody>
+              </p:sp>
+            </p:grpSp>
+            <p:cxnSp>
+              <p:nvCxnSpPr>
+                <p:cNvPr id="82" name="Verbinder: gewinkelt 81">
+                  <a:extLst>
+                    <a:ext uri="{FF2B5EF4-FFF2-40B4-BE49-F238E27FC236}">
+                      <a16:creationId xmlns:a16="http://schemas.microsoft.com/office/drawing/2014/main" id="{54D92774-EE94-484D-842A-E1F597F21F9D}"/>
+                    </a:ext>
+                  </a:extLst>
+                </p:cNvPr>
+                <p:cNvCxnSpPr>
+                  <a:stCxn id="73" idx="0"/>
+                  <a:endCxn id="34" idx="1"/>
+                </p:cNvCxnSpPr>
+                <p:nvPr/>
+              </p:nvCxnSpPr>
+              <p:spPr>
+                <a:xfrm rot="16200000" flipH="1" flipV="1">
+                  <a:off x="7864010" y="1872830"/>
+                  <a:ext cx="1222397" cy="1971365"/>
+                </a:xfrm>
+                <a:prstGeom prst="bentConnector3">
+                  <a:avLst>
+                    <a:gd name="adj1" fmla="val -5380"/>
+                  </a:avLst>
+                </a:prstGeom>
+                <a:ln w="9525">
+                  <a:solidFill>
+                    <a:schemeClr val="tx1"/>
+                  </a:solidFill>
+                  <a:tailEnd type="triangle"/>
+                </a:ln>
+              </p:spPr>
+              <p:style>
+                <a:lnRef idx="1">
+                  <a:schemeClr val="accent1"/>
+                </a:lnRef>
+                <a:fillRef idx="0">
+                  <a:schemeClr val="accent1"/>
+                </a:fillRef>
+                <a:effectRef idx="0">
+                  <a:schemeClr val="accent1"/>
+                </a:effectRef>
+                <a:fontRef idx="minor">
+                  <a:schemeClr val="tx1"/>
+                </a:fontRef>
+              </p:style>
+            </p:cxnSp>
+            <p:sp>
+              <p:nvSpPr>
+                <p:cNvPr id="84" name="Rechteck 83">
+                  <a:extLst>
+                    <a:ext uri="{FF2B5EF4-FFF2-40B4-BE49-F238E27FC236}">
+                      <a16:creationId xmlns:a16="http://schemas.microsoft.com/office/drawing/2014/main" id="{2E4B3601-67D1-4D5D-A3DE-C3C4FE1CCE28}"/>
+                    </a:ext>
+                  </a:extLst>
+                </p:cNvPr>
+                <p:cNvSpPr/>
+                <p:nvPr/>
+              </p:nvSpPr>
+              <p:spPr>
+                <a:xfrm>
+                  <a:off x="8001402" y="1929344"/>
+                  <a:ext cx="935086" cy="228221"/>
+                </a:xfrm>
+                <a:prstGeom prst="rect">
+                  <a:avLst/>
+                </a:prstGeom>
+                <a:noFill/>
+                <a:ln>
+                  <a:noFill/>
+                </a:ln>
+              </p:spPr>
+              <p:style>
+                <a:lnRef idx="2">
+                  <a:schemeClr val="accent1">
+                    <a:shade val="50000"/>
+                  </a:schemeClr>
+                </a:lnRef>
+                <a:fillRef idx="1">
+                  <a:schemeClr val="accent1"/>
+                </a:fillRef>
+                <a:effectRef idx="0">
+                  <a:schemeClr val="accent1"/>
+                </a:effectRef>
+                <a:fontRef idx="minor">
+                  <a:schemeClr val="lt1"/>
+                </a:fontRef>
+              </p:style>
+              <p:txBody>
+                <a:bodyPr rtlCol="0" anchor="ctr"/>
+                <a:lstStyle/>
+                <a:p>
+                  <a:pPr algn="ctr"/>
+                  <a:r>
+                    <a:rPr lang="en-US" sz="800" dirty="0">
+                      <a:solidFill>
+                        <a:schemeClr val="tx1"/>
+                      </a:solidFill>
+                      <a:latin typeface="3270 Nerd Font" panose="02000509000000000000" pitchFamily="49" charset="0"/>
+                      <a:ea typeface="3270 Nerd Font" panose="02000509000000000000" pitchFamily="49" charset="0"/>
+                      <a:cs typeface="3270 Nerd Font" panose="02000509000000000000" pitchFamily="49" charset="0"/>
+                    </a:rPr>
+                    <a:t>Write final prediction</a:t>
+                  </a:r>
+                </a:p>
+              </p:txBody>
+            </p:sp>
+          </p:grpSp>
+          <p:sp>
+            <p:nvSpPr>
+              <p:cNvPr id="89" name="Geschweifte Klammer rechts 88">
+                <a:extLst>
+                  <a:ext uri="{FF2B5EF4-FFF2-40B4-BE49-F238E27FC236}">
+                    <a16:creationId xmlns:a16="http://schemas.microsoft.com/office/drawing/2014/main" id="{63D019E1-4022-409D-9206-4FCBCE772FE6}"/>
+                  </a:ext>
+                </a:extLst>
+              </p:cNvPr>
+              <p:cNvSpPr/>
+              <p:nvPr/>
+            </p:nvSpPr>
+            <p:spPr>
+              <a:xfrm rot="5400000">
+                <a:off x="5914372" y="1275472"/>
+                <a:ext cx="363255" cy="7624704"/>
+              </a:xfrm>
+              <a:prstGeom prst="rightBrace">
+                <a:avLst/>
+              </a:prstGeom>
+              <a:ln w="19050">
+                <a:solidFill>
+                  <a:schemeClr val="tx1"/>
+                </a:solidFill>
+              </a:ln>
+            </p:spPr>
+            <p:style>
+              <a:lnRef idx="1">
+                <a:schemeClr val="accent1"/>
+              </a:lnRef>
+              <a:fillRef idx="0">
+                <a:schemeClr val="accent1"/>
+              </a:fillRef>
+              <a:effectRef idx="0">
+                <a:schemeClr val="accent1"/>
+              </a:effectRef>
+              <a:fontRef idx="minor">
+                <a:schemeClr val="tx1"/>
+              </a:fontRef>
+            </p:style>
+            <p:txBody>
+              <a:bodyPr rtlCol="0" anchor="ctr"/>
+              <a:lstStyle/>
+              <a:p>
+                <a:pPr algn="ctr"/>
+                <a:endParaRPr lang="en-US"/>
+              </a:p>
+            </p:txBody>
+          </p:sp>
+          <p:sp>
+            <p:nvSpPr>
+              <p:cNvPr id="91" name="Rechteck: abgerundete Ecken 90">
+                <a:extLst>
+                  <a:ext uri="{FF2B5EF4-FFF2-40B4-BE49-F238E27FC236}">
+                    <a16:creationId xmlns:a16="http://schemas.microsoft.com/office/drawing/2014/main" id="{4A1DB85F-5E8C-48B1-9F38-9AD1C203F0EB}"/>
+                  </a:ext>
+                </a:extLst>
+              </p:cNvPr>
+              <p:cNvSpPr/>
+              <p:nvPr/>
+            </p:nvSpPr>
+            <p:spPr>
+              <a:xfrm>
+                <a:off x="5245417" y="5386240"/>
+                <a:ext cx="1701164" cy="551498"/>
+              </a:xfrm>
+              <a:prstGeom prst="roundRect">
+                <a:avLst/>
+              </a:prstGeom>
+              <a:solidFill>
+                <a:schemeClr val="accent5">
+                  <a:lumMod val="40000"/>
+                  <a:lumOff val="60000"/>
+                </a:schemeClr>
+              </a:solidFill>
+              <a:ln w="19050">
+                <a:solidFill>
+                  <a:schemeClr val="accent1"/>
+                </a:solidFill>
+              </a:ln>
+            </p:spPr>
+            <p:style>
+              <a:lnRef idx="2">
+                <a:schemeClr val="accent3">
+                  <a:shade val="50000"/>
+                </a:schemeClr>
+              </a:lnRef>
+              <a:fillRef idx="1">
+                <a:schemeClr val="accent3"/>
+              </a:fillRef>
+              <a:effectRef idx="0">
+                <a:schemeClr val="accent3"/>
+              </a:effectRef>
+              <a:fontRef idx="minor">
+                <a:schemeClr val="lt1"/>
+              </a:fontRef>
+            </p:style>
+            <p:txBody>
+              <a:bodyPr rtlCol="0" anchor="ctr"/>
+              <a:lstStyle/>
+              <a:p>
+                <a:pPr algn="ctr"/>
+                <a:r>
+                  <a:rPr lang="de-DE" sz="1600" dirty="0">
+                    <a:solidFill>
+                      <a:schemeClr val="tx1"/>
+                    </a:solidFill>
+                    <a:latin typeface="3270 Nerd Font" panose="02000509000000000000" pitchFamily="49" charset="0"/>
+                    <a:ea typeface="3270 Nerd Font" panose="02000509000000000000" pitchFamily="49" charset="0"/>
+                    <a:cs typeface="3270 Nerd Font" panose="02000509000000000000" pitchFamily="49" charset="0"/>
+                  </a:rPr>
+                  <a:t>Frontend </a:t>
+                </a:r>
+                <a:r>
+                  <a:rPr lang="de-DE" sz="1600" dirty="0" err="1">
+                    <a:solidFill>
+                      <a:schemeClr val="tx1"/>
+                    </a:solidFill>
+                    <a:latin typeface="3270 Nerd Font" panose="02000509000000000000" pitchFamily="49" charset="0"/>
+                    <a:ea typeface="3270 Nerd Font" panose="02000509000000000000" pitchFamily="49" charset="0"/>
+                    <a:cs typeface="3270 Nerd Font" panose="02000509000000000000" pitchFamily="49" charset="0"/>
+                  </a:rPr>
+                  <a:t>Visualization</a:t>
+                </a:r>
+                <a:endParaRPr lang="en-US" sz="1600" dirty="0">
+                  <a:solidFill>
+                    <a:schemeClr val="tx1"/>
+                  </a:solidFill>
+                  <a:latin typeface="3270 Nerd Font" panose="02000509000000000000" pitchFamily="49" charset="0"/>
+                  <a:ea typeface="3270 Nerd Font" panose="02000509000000000000" pitchFamily="49" charset="0"/>
+                  <a:cs typeface="3270 Nerd Font" panose="02000509000000000000" pitchFamily="49" charset="0"/>
+                </a:endParaRPr>
+              </a:p>
+            </p:txBody>
+          </p:sp>
+        </p:grpSp>
+      </p:grpSp>
+      <p:grpSp>
+        <p:nvGrpSpPr>
+          <p:cNvPr id="9" name="Gruppieren 8">
+            <a:extLst>
+              <a:ext uri="{FF2B5EF4-FFF2-40B4-BE49-F238E27FC236}">
+                <a16:creationId xmlns:a16="http://schemas.microsoft.com/office/drawing/2014/main" id="{02193AC4-DF2C-42DE-8182-C5EA2CCE9D87}"/>
+              </a:ext>
+            </a:extLst>
+          </p:cNvPr>
+          <p:cNvGrpSpPr/>
+          <p:nvPr/>
+        </p:nvGrpSpPr>
+        <p:grpSpPr>
+          <a:xfrm>
+            <a:off x="137786" y="6288066"/>
+            <a:ext cx="6375748" cy="493512"/>
+            <a:chOff x="137786" y="6288066"/>
+            <a:chExt cx="6375748" cy="493512"/>
+          </a:xfrm>
+        </p:grpSpPr>
+        <p:sp>
+          <p:nvSpPr>
+            <p:cNvPr id="8" name="Rechteck 7">
+              <a:extLst>
+                <a:ext uri="{FF2B5EF4-FFF2-40B4-BE49-F238E27FC236}">
+                  <a16:creationId xmlns:a16="http://schemas.microsoft.com/office/drawing/2014/main" id="{C5421091-77DD-4562-8417-D79CA51F1678}"/>
+                </a:ext>
+              </a:extLst>
+            </p:cNvPr>
+            <p:cNvSpPr/>
+            <p:nvPr/>
+          </p:nvSpPr>
+          <p:spPr>
+            <a:xfrm>
+              <a:off x="137786" y="6288066"/>
+              <a:ext cx="6375748" cy="493512"/>
+            </a:xfrm>
+            <a:prstGeom prst="rect">
+              <a:avLst/>
+            </a:prstGeom>
+            <a:solidFill>
+              <a:schemeClr val="bg1"/>
+            </a:solidFill>
+            <a:ln>
+              <a:solidFill>
+                <a:schemeClr val="bg1"/>
+              </a:solidFill>
+            </a:ln>
+          </p:spPr>
+          <p:style>
+            <a:lnRef idx="2">
+              <a:schemeClr val="accent1">
+                <a:shade val="50000"/>
+              </a:schemeClr>
+            </a:lnRef>
+            <a:fillRef idx="1">
+              <a:schemeClr val="accent1"/>
+            </a:fillRef>
+            <a:effectRef idx="0">
+              <a:schemeClr val="accent1"/>
+            </a:effectRef>
+            <a:fontRef idx="minor">
+              <a:schemeClr val="lt1"/>
+            </a:fontRef>
+          </p:style>
+          <p:txBody>
+            <a:bodyPr rtlCol="0" anchor="ctr"/>
+            <a:lstStyle/>
+            <a:p>
+              <a:pPr algn="ctr"/>
+              <a:endParaRPr lang="en-US"/>
+            </a:p>
+          </p:txBody>
+        </p:sp>
+        <p:grpSp>
+          <p:nvGrpSpPr>
+            <p:cNvPr id="93" name="Gruppieren 92">
+              <a:extLst>
+                <a:ext uri="{FF2B5EF4-FFF2-40B4-BE49-F238E27FC236}">
+                  <a16:creationId xmlns:a16="http://schemas.microsoft.com/office/drawing/2014/main" id="{77E87E0D-A5EA-4FF4-9541-60E3D790986F}"/>
+                </a:ext>
+              </a:extLst>
+            </p:cNvPr>
+            <p:cNvGrpSpPr/>
+            <p:nvPr/>
+          </p:nvGrpSpPr>
+          <p:grpSpPr>
+            <a:xfrm>
+              <a:off x="203703" y="6363098"/>
+              <a:ext cx="6228376" cy="340415"/>
+              <a:chOff x="203703" y="6363098"/>
+              <a:chExt cx="6228376" cy="340415"/>
+            </a:xfrm>
+          </p:grpSpPr>
+          <p:grpSp>
+            <p:nvGrpSpPr>
+              <p:cNvPr id="86" name="Gruppieren 85">
+                <a:extLst>
+                  <a:ext uri="{FF2B5EF4-FFF2-40B4-BE49-F238E27FC236}">
+                    <a16:creationId xmlns:a16="http://schemas.microsoft.com/office/drawing/2014/main" id="{DC4D731D-DB8A-4FA0-AE7F-CA3B3F6FD4D8}"/>
+                  </a:ext>
+                </a:extLst>
+              </p:cNvPr>
+              <p:cNvGrpSpPr/>
+              <p:nvPr/>
+            </p:nvGrpSpPr>
+            <p:grpSpPr>
+              <a:xfrm>
+                <a:off x="203703" y="6367399"/>
+                <a:ext cx="5150480" cy="336114"/>
+                <a:chOff x="81920" y="160752"/>
+                <a:chExt cx="5150480" cy="336114"/>
+              </a:xfrm>
+            </p:grpSpPr>
+            <p:sp>
+              <p:nvSpPr>
+                <p:cNvPr id="45" name="Rechteck: abgerundete Ecken 44">
+                  <a:extLst>
+                    <a:ext uri="{FF2B5EF4-FFF2-40B4-BE49-F238E27FC236}">
+                      <a16:creationId xmlns:a16="http://schemas.microsoft.com/office/drawing/2014/main" id="{8201F38C-EA64-4514-BFC8-E2E67E876FF3}"/>
+                    </a:ext>
+                  </a:extLst>
+                </p:cNvPr>
+                <p:cNvSpPr/>
+                <p:nvPr/>
+              </p:nvSpPr>
+              <p:spPr>
+                <a:xfrm>
+                  <a:off x="81920" y="160752"/>
+                  <a:ext cx="931102" cy="334027"/>
+                </a:xfrm>
+                <a:prstGeom prst="roundRect">
+                  <a:avLst/>
+                </a:prstGeom>
+                <a:noFill/>
+                <a:ln w="19050">
+                  <a:solidFill>
+                    <a:schemeClr val="accent1"/>
+                  </a:solidFill>
+                </a:ln>
+              </p:spPr>
+              <p:style>
+                <a:lnRef idx="2">
+                  <a:schemeClr val="accent3">
+                    <a:shade val="50000"/>
+                  </a:schemeClr>
+                </a:lnRef>
+                <a:fillRef idx="1">
+                  <a:schemeClr val="accent3"/>
+                </a:fillRef>
+                <a:effectRef idx="0">
+                  <a:schemeClr val="accent3"/>
+                </a:effectRef>
+                <a:fontRef idx="minor">
+                  <a:schemeClr val="lt1"/>
+                </a:fontRef>
+              </p:style>
+              <p:txBody>
+                <a:bodyPr rtlCol="0" anchor="ctr"/>
+                <a:lstStyle/>
+                <a:p>
+                  <a:pPr algn="ctr"/>
+                  <a:r>
+                    <a:rPr lang="en-US" sz="800" dirty="0">
+                      <a:solidFill>
+                        <a:schemeClr val="tx1"/>
+                      </a:solidFill>
+                      <a:latin typeface="3270 Nerd Font" panose="02000509000000000000" pitchFamily="49" charset="0"/>
+                      <a:ea typeface="3270 Nerd Font" panose="02000509000000000000" pitchFamily="49" charset="0"/>
+                      <a:cs typeface="3270 Nerd Font" panose="02000509000000000000" pitchFamily="49" charset="0"/>
+                    </a:rPr>
+                    <a:t>Docker Container</a:t>
+                  </a:r>
+                </a:p>
+              </p:txBody>
+            </p:sp>
+            <p:grpSp>
+              <p:nvGrpSpPr>
+                <p:cNvPr id="85" name="Gruppieren 84">
+                  <a:extLst>
+                    <a:ext uri="{FF2B5EF4-FFF2-40B4-BE49-F238E27FC236}">
+                      <a16:creationId xmlns:a16="http://schemas.microsoft.com/office/drawing/2014/main" id="{4004A612-1D0F-4C0B-9626-93459615CF84}"/>
+                    </a:ext>
+                  </a:extLst>
+                </p:cNvPr>
+                <p:cNvGrpSpPr/>
+                <p:nvPr/>
+              </p:nvGrpSpPr>
+              <p:grpSpPr>
+                <a:xfrm>
+                  <a:off x="1160745" y="160752"/>
+                  <a:ext cx="4071655" cy="336114"/>
+                  <a:chOff x="1160745" y="160752"/>
+                  <a:chExt cx="4071655" cy="336114"/>
+                </a:xfrm>
+              </p:grpSpPr>
+              <p:sp>
+                <p:nvSpPr>
+                  <p:cNvPr id="12" name="Rechteck: abgerundete Ecken 11">
+                    <a:extLst>
+                      <a:ext uri="{FF2B5EF4-FFF2-40B4-BE49-F238E27FC236}">
+                        <a16:creationId xmlns:a16="http://schemas.microsoft.com/office/drawing/2014/main" id="{E275A931-8DA5-4FEF-9375-DF7671FF5296}"/>
+                      </a:ext>
+                    </a:extLst>
+                  </p:cNvPr>
+                  <p:cNvSpPr/>
+                  <p:nvPr/>
+                </p:nvSpPr>
+                <p:spPr>
+                  <a:xfrm>
+                    <a:off x="1160745" y="162838"/>
+                    <a:ext cx="931102" cy="334027"/>
+                  </a:xfrm>
+                  <a:prstGeom prst="roundRect">
+                    <a:avLst/>
+                  </a:prstGeom>
+                </p:spPr>
+                <p:style>
+                  <a:lnRef idx="2">
+                    <a:schemeClr val="accent3">
+                      <a:shade val="50000"/>
+                    </a:schemeClr>
+                  </a:lnRef>
+                  <a:fillRef idx="1">
+                    <a:schemeClr val="accent3"/>
+                  </a:fillRef>
+                  <a:effectRef idx="0">
+                    <a:schemeClr val="accent3"/>
+                  </a:effectRef>
+                  <a:fontRef idx="minor">
+                    <a:schemeClr val="lt1"/>
+                  </a:fontRef>
+                </p:style>
+                <p:txBody>
+                  <a:bodyPr rtlCol="0" anchor="ctr"/>
+                  <a:lstStyle/>
+                  <a:p>
+                    <a:pPr algn="ctr"/>
+                    <a:r>
+                      <a:rPr lang="de-DE" sz="800" dirty="0">
+                        <a:solidFill>
+                          <a:schemeClr val="tx1"/>
+                        </a:solidFill>
+                        <a:latin typeface="3270 Nerd Font" panose="02000509000000000000" pitchFamily="49" charset="0"/>
+                        <a:ea typeface="3270 Nerd Font" panose="02000509000000000000" pitchFamily="49" charset="0"/>
+                        <a:cs typeface="3270 Nerd Font" panose="02000509000000000000" pitchFamily="49" charset="0"/>
+                      </a:rPr>
+                      <a:t>Machines</a:t>
+                    </a:r>
+                    <a:endParaRPr lang="en-US" sz="800" dirty="0">
+                      <a:solidFill>
+                        <a:schemeClr val="tx1"/>
+                      </a:solidFill>
+                      <a:latin typeface="3270 Nerd Font" panose="02000509000000000000" pitchFamily="49" charset="0"/>
+                      <a:ea typeface="3270 Nerd Font" panose="02000509000000000000" pitchFamily="49" charset="0"/>
+                      <a:cs typeface="3270 Nerd Font" panose="02000509000000000000" pitchFamily="49" charset="0"/>
+                    </a:endParaRPr>
+                  </a:p>
+                </p:txBody>
+              </p:sp>
+              <p:cxnSp>
+                <p:nvCxnSpPr>
+                  <p:cNvPr id="30" name="Gerade Verbindung mit Pfeil 29">
+                    <a:extLst>
+                      <a:ext uri="{FF2B5EF4-FFF2-40B4-BE49-F238E27FC236}">
+                        <a16:creationId xmlns:a16="http://schemas.microsoft.com/office/drawing/2014/main" id="{C6E542D0-481B-4AEB-8233-382E39B303BC}"/>
+                      </a:ext>
+                    </a:extLst>
+                  </p:cNvPr>
+                  <p:cNvCxnSpPr>
+                    <a:cxnSpLocks/>
+                  </p:cNvCxnSpPr>
+                  <p:nvPr/>
+                </p:nvCxnSpPr>
+                <p:spPr>
+                  <a:xfrm>
+                    <a:off x="3315223" y="327766"/>
+                    <a:ext cx="465551" cy="0"/>
+                  </a:xfrm>
+                  <a:prstGeom prst="straightConnector1">
+                    <a:avLst/>
+                  </a:prstGeom>
+                  <a:ln>
+                    <a:solidFill>
+                      <a:srgbClr val="C00000"/>
+                    </a:solidFill>
+                    <a:prstDash val="dash"/>
+                    <a:tailEnd type="triangle"/>
+                  </a:ln>
+                </p:spPr>
+                <p:style>
+                  <a:lnRef idx="2">
+                    <a:schemeClr val="accent1"/>
+                  </a:lnRef>
+                  <a:fillRef idx="0">
+                    <a:schemeClr val="accent1"/>
+                  </a:fillRef>
+                  <a:effectRef idx="1">
+                    <a:schemeClr val="accent1"/>
+                  </a:effectRef>
+                  <a:fontRef idx="minor">
+                    <a:schemeClr val="tx1"/>
+                  </a:fontRef>
+                </p:style>
+              </p:cxnSp>
+              <p:sp>
+                <p:nvSpPr>
+                  <p:cNvPr id="32" name="Textfeld 31">
+                    <a:extLst>
+                      <a:ext uri="{FF2B5EF4-FFF2-40B4-BE49-F238E27FC236}">
+                        <a16:creationId xmlns:a16="http://schemas.microsoft.com/office/drawing/2014/main" id="{101387DF-3797-432A-8F84-3DDE5E4BAAEA}"/>
+                      </a:ext>
+                    </a:extLst>
+                  </p:cNvPr>
+                  <p:cNvSpPr txBox="1"/>
+                  <p:nvPr/>
+                </p:nvSpPr>
+                <p:spPr>
+                  <a:xfrm>
+                    <a:off x="3289543" y="160752"/>
+                    <a:ext cx="465551" cy="215444"/>
+                  </a:xfrm>
+                  <a:prstGeom prst="rect">
+                    <a:avLst/>
+                  </a:prstGeom>
+                  <a:noFill/>
+                </p:spPr>
+                <p:txBody>
+                  <a:bodyPr wrap="square" rtlCol="0">
+                    <a:spAutoFit/>
+                  </a:bodyPr>
+                  <a:lstStyle/>
+                  <a:p>
+                    <a:r>
+                      <a:rPr lang="de-DE" sz="800" dirty="0">
+                        <a:latin typeface="3270 Nerd Font" panose="02000509000000000000" pitchFamily="49" charset="0"/>
+                        <a:ea typeface="3270 Nerd Font" panose="02000509000000000000" pitchFamily="49" charset="0"/>
+                        <a:cs typeface="3270 Nerd Font" panose="02000509000000000000" pitchFamily="49" charset="0"/>
+                      </a:rPr>
+                      <a:t>Kafka</a:t>
+                    </a:r>
+                    <a:endParaRPr lang="en-US" sz="800" dirty="0">
+                      <a:latin typeface="3270 Nerd Font" panose="02000509000000000000" pitchFamily="49" charset="0"/>
+                      <a:ea typeface="3270 Nerd Font" panose="02000509000000000000" pitchFamily="49" charset="0"/>
+                      <a:cs typeface="3270 Nerd Font" panose="02000509000000000000" pitchFamily="49" charset="0"/>
+                    </a:endParaRPr>
+                  </a:p>
+                </p:txBody>
+              </p:sp>
+              <p:cxnSp>
+                <p:nvCxnSpPr>
+                  <p:cNvPr id="68" name="Gerade Verbindung mit Pfeil 67">
+                    <a:extLst>
+                      <a:ext uri="{FF2B5EF4-FFF2-40B4-BE49-F238E27FC236}">
+                        <a16:creationId xmlns:a16="http://schemas.microsoft.com/office/drawing/2014/main" id="{6A575254-6CA3-4990-B590-82614DB8ADC2}"/>
+                      </a:ext>
+                    </a:extLst>
+                  </p:cNvPr>
+                  <p:cNvCxnSpPr>
+                    <a:cxnSpLocks/>
+                  </p:cNvCxnSpPr>
+                  <p:nvPr/>
+                </p:nvCxnSpPr>
+                <p:spPr>
+                  <a:xfrm>
+                    <a:off x="3928497" y="331854"/>
+                    <a:ext cx="465551" cy="0"/>
+                  </a:xfrm>
+                  <a:prstGeom prst="straightConnector1">
+                    <a:avLst/>
+                  </a:prstGeom>
+                  <a:ln>
+                    <a:solidFill>
+                      <a:schemeClr val="tx1"/>
+                    </a:solidFill>
+                    <a:tailEnd type="triangle"/>
+                  </a:ln>
+                </p:spPr>
+                <p:style>
+                  <a:lnRef idx="2">
+                    <a:schemeClr val="accent1"/>
+                  </a:lnRef>
+                  <a:fillRef idx="0">
+                    <a:schemeClr val="accent1"/>
+                  </a:fillRef>
+                  <a:effectRef idx="1">
+                    <a:schemeClr val="accent1"/>
+                  </a:effectRef>
+                  <a:fontRef idx="minor">
+                    <a:schemeClr val="tx1"/>
+                  </a:fontRef>
+                </p:style>
+              </p:cxnSp>
+              <p:sp>
+                <p:nvSpPr>
+                  <p:cNvPr id="69" name="Textfeld 68">
+                    <a:extLst>
+                      <a:ext uri="{FF2B5EF4-FFF2-40B4-BE49-F238E27FC236}">
+                        <a16:creationId xmlns:a16="http://schemas.microsoft.com/office/drawing/2014/main" id="{03EB36EB-68BD-4BFA-86CF-E157EA554768}"/>
+                      </a:ext>
+                    </a:extLst>
+                  </p:cNvPr>
+                  <p:cNvSpPr txBox="1"/>
+                  <p:nvPr/>
+                </p:nvSpPr>
+                <p:spPr>
+                  <a:xfrm>
+                    <a:off x="3928497" y="162838"/>
+                    <a:ext cx="465551" cy="215444"/>
+                  </a:xfrm>
+                  <a:prstGeom prst="rect">
+                    <a:avLst/>
+                  </a:prstGeom>
+                  <a:noFill/>
+                </p:spPr>
+                <p:txBody>
+                  <a:bodyPr wrap="square" rtlCol="0">
+                    <a:spAutoFit/>
+                  </a:bodyPr>
+                  <a:lstStyle/>
+                  <a:p>
+                    <a:r>
+                      <a:rPr lang="de-DE" sz="800" dirty="0">
+                        <a:latin typeface="3270 Nerd Font" panose="02000509000000000000" pitchFamily="49" charset="0"/>
+                        <a:ea typeface="3270 Nerd Font" panose="02000509000000000000" pitchFamily="49" charset="0"/>
+                        <a:cs typeface="3270 Nerd Font" panose="02000509000000000000" pitchFamily="49" charset="0"/>
+                      </a:rPr>
+                      <a:t>Data</a:t>
+                    </a:r>
+                    <a:endParaRPr lang="en-US" sz="800" dirty="0">
+                      <a:latin typeface="3270 Nerd Font" panose="02000509000000000000" pitchFamily="49" charset="0"/>
+                      <a:ea typeface="3270 Nerd Font" panose="02000509000000000000" pitchFamily="49" charset="0"/>
+                      <a:cs typeface="3270 Nerd Font" panose="02000509000000000000" pitchFamily="49" charset="0"/>
+                    </a:endParaRPr>
+                  </a:p>
+                </p:txBody>
+              </p:sp>
+              <p:sp>
+                <p:nvSpPr>
+                  <p:cNvPr id="70" name="Flussdiagramm: Magnetplattenspeicher 69">
+                    <a:extLst>
+                      <a:ext uri="{FF2B5EF4-FFF2-40B4-BE49-F238E27FC236}">
+                        <a16:creationId xmlns:a16="http://schemas.microsoft.com/office/drawing/2014/main" id="{8EFD67E4-5BA3-41EF-9647-4C77B200D088}"/>
+                      </a:ext>
+                    </a:extLst>
+                  </p:cNvPr>
+                  <p:cNvSpPr/>
+                  <p:nvPr/>
+                </p:nvSpPr>
+                <p:spPr>
+                  <a:xfrm>
+                    <a:off x="4539256" y="162838"/>
+                    <a:ext cx="693144" cy="334028"/>
+                  </a:xfrm>
+                  <a:prstGeom prst="flowChartMagneticDisk">
+                    <a:avLst/>
+                  </a:prstGeom>
+                  <a:solidFill>
+                    <a:schemeClr val="accent6">
+                      <a:lumMod val="40000"/>
+                      <a:lumOff val="60000"/>
+                    </a:schemeClr>
+                  </a:solidFill>
+                  <a:ln>
+                    <a:solidFill>
+                      <a:schemeClr val="tx1"/>
+                    </a:solidFill>
+                  </a:ln>
+                </p:spPr>
+                <p:style>
+                  <a:lnRef idx="2">
+                    <a:schemeClr val="accent1">
+                      <a:shade val="50000"/>
+                    </a:schemeClr>
+                  </a:lnRef>
+                  <a:fillRef idx="1">
+                    <a:schemeClr val="accent1"/>
+                  </a:fillRef>
+                  <a:effectRef idx="0">
+                    <a:schemeClr val="accent1"/>
+                  </a:effectRef>
+                  <a:fontRef idx="minor">
+                    <a:schemeClr val="lt1"/>
+                  </a:fontRef>
+                </p:style>
+                <p:txBody>
+                  <a:bodyPr rtlCol="0" anchor="ctr"/>
+                  <a:lstStyle/>
+                  <a:p>
+                    <a:pPr algn="ctr"/>
+                    <a:r>
+                      <a:rPr lang="de-DE" sz="800" dirty="0">
+                        <a:solidFill>
+                          <a:schemeClr val="tx1"/>
+                        </a:solidFill>
+                        <a:latin typeface="3270 Nerd Font" panose="02000509000000000000" pitchFamily="49" charset="0"/>
+                        <a:ea typeface="3270 Nerd Font" panose="02000509000000000000" pitchFamily="49" charset="0"/>
+                        <a:cs typeface="3270 Nerd Font" panose="02000509000000000000" pitchFamily="49" charset="0"/>
+                      </a:rPr>
+                      <a:t>Databases</a:t>
+                    </a:r>
+                    <a:endParaRPr lang="en-US" sz="800" dirty="0">
+                      <a:solidFill>
+                        <a:schemeClr val="tx1"/>
+                      </a:solidFill>
+                      <a:latin typeface="3270 Nerd Font" panose="02000509000000000000" pitchFamily="49" charset="0"/>
+                      <a:ea typeface="3270 Nerd Font" panose="02000509000000000000" pitchFamily="49" charset="0"/>
+                      <a:cs typeface="3270 Nerd Font" panose="02000509000000000000" pitchFamily="49" charset="0"/>
+                    </a:endParaRPr>
+                  </a:p>
+                </p:txBody>
+              </p:sp>
+              <p:sp>
+                <p:nvSpPr>
+                  <p:cNvPr id="46" name="Ellipse 45">
+                    <a:extLst>
+                      <a:ext uri="{FF2B5EF4-FFF2-40B4-BE49-F238E27FC236}">
+                        <a16:creationId xmlns:a16="http://schemas.microsoft.com/office/drawing/2014/main" id="{B2520A52-3E00-46F4-B844-F41B02895755}"/>
+                      </a:ext>
+                    </a:extLst>
+                  </p:cNvPr>
+                  <p:cNvSpPr/>
+                  <p:nvPr/>
+                </p:nvSpPr>
+                <p:spPr>
+                  <a:xfrm rot="5400000">
+                    <a:off x="2559823" y="-137786"/>
+                    <a:ext cx="284252" cy="931103"/>
+                  </a:xfrm>
+                  <a:prstGeom prst="ellipse">
+                    <a:avLst/>
+                  </a:prstGeom>
+                </p:spPr>
+                <p:style>
+                  <a:lnRef idx="2">
+                    <a:schemeClr val="accent2">
+                      <a:shade val="50000"/>
+                    </a:schemeClr>
+                  </a:lnRef>
+                  <a:fillRef idx="1">
+                    <a:schemeClr val="accent2"/>
+                  </a:fillRef>
+                  <a:effectRef idx="0">
+                    <a:schemeClr val="accent2"/>
+                  </a:effectRef>
+                  <a:fontRef idx="minor">
+                    <a:schemeClr val="lt1"/>
+                  </a:fontRef>
+                </p:style>
+                <p:txBody>
+                  <a:bodyPr vert="vert270" rtlCol="0" anchor="ctr"/>
+                  <a:lstStyle/>
+                  <a:p>
+                    <a:pPr algn="ctr"/>
+                    <a:r>
+                      <a:rPr lang="en-US" sz="800" dirty="0">
+                        <a:solidFill>
+                          <a:schemeClr val="tx1"/>
+                        </a:solidFill>
+                        <a:latin typeface="3270 Nerd Font" panose="02000509000000000000" pitchFamily="49" charset="0"/>
+                        <a:ea typeface="3270 Nerd Font" panose="02000509000000000000" pitchFamily="49" charset="0"/>
+                        <a:cs typeface="3270 Nerd Font" panose="02000509000000000000" pitchFamily="49" charset="0"/>
+                      </a:rPr>
+                      <a:t>Models</a:t>
+                    </a:r>
+                  </a:p>
+                </p:txBody>
+              </p:sp>
+            </p:grpSp>
+          </p:grpSp>
+          <p:sp>
+            <p:nvSpPr>
+              <p:cNvPr id="92" name="Rechteck: abgerundete Ecken 91">
+                <a:extLst>
+                  <a:ext uri="{FF2B5EF4-FFF2-40B4-BE49-F238E27FC236}">
+                    <a16:creationId xmlns:a16="http://schemas.microsoft.com/office/drawing/2014/main" id="{57F69B59-6A57-4C3C-AE9B-2DFC816C5E51}"/>
+                  </a:ext>
+                </a:extLst>
+              </p:cNvPr>
+              <p:cNvSpPr/>
+              <p:nvPr/>
+            </p:nvSpPr>
+            <p:spPr>
+              <a:xfrm>
+                <a:off x="5499391" y="6363098"/>
+                <a:ext cx="932688" cy="338328"/>
+              </a:xfrm>
+              <a:prstGeom prst="roundRect">
+                <a:avLst/>
+              </a:prstGeom>
+              <a:solidFill>
+                <a:schemeClr val="accent5">
+                  <a:lumMod val="40000"/>
+                  <a:lumOff val="60000"/>
+                </a:schemeClr>
+              </a:solidFill>
+              <a:ln w="19050">
+                <a:solidFill>
+                  <a:schemeClr val="accent1"/>
+                </a:solidFill>
+              </a:ln>
+            </p:spPr>
+            <p:style>
+              <a:lnRef idx="2">
+                <a:schemeClr val="accent3">
+                  <a:shade val="50000"/>
+                </a:schemeClr>
+              </a:lnRef>
+              <a:fillRef idx="1">
+                <a:schemeClr val="accent3"/>
+              </a:fillRef>
+              <a:effectRef idx="0">
+                <a:schemeClr val="accent3"/>
+              </a:effectRef>
+              <a:fontRef idx="minor">
+                <a:schemeClr val="lt1"/>
+              </a:fontRef>
+            </p:style>
+            <p:txBody>
+              <a:bodyPr rtlCol="0" anchor="ctr"/>
+              <a:lstStyle/>
+              <a:p>
+                <a:pPr algn="ctr"/>
+                <a:r>
+                  <a:rPr lang="de-DE" sz="800" dirty="0">
+                    <a:solidFill>
+                      <a:schemeClr val="tx1"/>
+                    </a:solidFill>
+                    <a:latin typeface="3270 Nerd Font" panose="02000509000000000000" pitchFamily="49" charset="0"/>
+                    <a:ea typeface="3270 Nerd Font" panose="02000509000000000000" pitchFamily="49" charset="0"/>
+                    <a:cs typeface="3270 Nerd Font" panose="02000509000000000000" pitchFamily="49" charset="0"/>
+                  </a:rPr>
+                  <a:t>Frontend</a:t>
+                </a:r>
+                <a:endParaRPr lang="en-US" sz="800" dirty="0">
+                  <a:solidFill>
+                    <a:schemeClr val="tx1"/>
+                  </a:solidFill>
+                  <a:latin typeface="3270 Nerd Font" panose="02000509000000000000" pitchFamily="49" charset="0"/>
+                  <a:ea typeface="3270 Nerd Font" panose="02000509000000000000" pitchFamily="49" charset="0"/>
+                  <a:cs typeface="3270 Nerd Font" panose="02000509000000000000" pitchFamily="49" charset="0"/>
+                </a:endParaRPr>
+              </a:p>
+            </p:txBody>
+          </p:sp>
+        </p:grpSp>
+      </p:grpSp>
+    </p:spTree>
+    <p:extLst>
+      <p:ext uri="{BB962C8B-B14F-4D97-AF65-F5344CB8AC3E}">
+        <p14:creationId xmlns:p14="http://schemas.microsoft.com/office/powerpoint/2010/main" val="2033768617"/>
+      </p:ext>
+    </p:extLst>
+  </p:cSld>
+  <p:clrMapOvr>
+    <a:masterClrMapping/>
+  </p:clrMapOvr>
+</p:sld>
+</file>
+
 <file path=ppt/theme/theme1.xml><?xml version="1.0" encoding="utf-8"?>
 <a:theme xmlns:a="http://schemas.openxmlformats.org/drawingml/2006/main" name="Office">
   <a:themeElements>

</xml_diff>